<commit_message>
Added to the manuscript the new plot for rainfall averages in fc and obs
</commit_message>
<xml_diff>
--- a/Manuscript/Figures/03_DATA_Annual_Average_Rainfall.pptx
+++ b/Manuscript/Figures/03_DATA_Annual_Average_Rainfall.pptx
@@ -115,7 +115,7 @@
 <file path=ppt/revisionInfo.xml><?xml version="1.0" encoding="utf-8"?>
 <p1510:revInfo xmlns:a="http://schemas.openxmlformats.org/drawingml/2006/main" xmlns:r="http://schemas.openxmlformats.org/officeDocument/2006/relationships" xmlns:p1510="http://schemas.microsoft.com/office/powerpoint/2015/10/main">
   <p1510:revLst>
-    <p1510:client id="{E4EB9531-B35B-4F76-8762-A23C9D2F4928}" v="4" dt="2023-11-06T22:04:25.049"/>
+    <p1510:client id="{E4EB9531-B35B-4F76-8762-A23C9D2F4928}" v="6" dt="2023-11-08T22:36:23.894"/>
   </p1510:revLst>
 </p1510:revInfo>
 </file>
@@ -124,13 +124,13 @@
 <pc:chgInfo xmlns:a="http://schemas.openxmlformats.org/drawingml/2006/main" xmlns:r="http://schemas.openxmlformats.org/officeDocument/2006/relationships" xmlns:ac="http://schemas.microsoft.com/office/drawing/2013/main/command" xmlns:pc="http://schemas.microsoft.com/office/powerpoint/2013/main/command">
   <pc:docChgLst>
     <pc:chgData name="Fatima Pillosu" userId="a6295d4dc9e22643" providerId="LiveId" clId="{E4EB9531-B35B-4F76-8762-A23C9D2F4928}"/>
-    <pc:docChg chg="undo custSel modSld">
-      <pc:chgData name="Fatima Pillosu" userId="a6295d4dc9e22643" providerId="LiveId" clId="{E4EB9531-B35B-4F76-8762-A23C9D2F4928}" dt="2023-11-06T22:44:18.778" v="284"/>
+    <pc:docChg chg="undo custSel addSld delSld modSld">
+      <pc:chgData name="Fatima Pillosu" userId="a6295d4dc9e22643" providerId="LiveId" clId="{E4EB9531-B35B-4F76-8762-A23C9D2F4928}" dt="2023-11-08T22:39:33.949" v="516" actId="47"/>
       <pc:docMkLst>
         <pc:docMk/>
       </pc:docMkLst>
       <pc:sldChg chg="addSp delSp modSp mod">
-        <pc:chgData name="Fatima Pillosu" userId="a6295d4dc9e22643" providerId="LiveId" clId="{E4EB9531-B35B-4F76-8762-A23C9D2F4928}" dt="2023-11-06T22:44:18.778" v="284"/>
+        <pc:chgData name="Fatima Pillosu" userId="a6295d4dc9e22643" providerId="LiveId" clId="{E4EB9531-B35B-4F76-8762-A23C9D2F4928}" dt="2023-11-08T22:38:19.835" v="515" actId="1037"/>
         <pc:sldMkLst>
           <pc:docMk/>
           <pc:sldMk cId="1967199282" sldId="256"/>
@@ -943,20 +943,228 @@
             <ac:spMk id="148" creationId="{8F017204-CE2A-109A-7434-0D2418BCD89C}"/>
           </ac:spMkLst>
         </pc:spChg>
+        <pc:spChg chg="add mod ord">
+          <ac:chgData name="Fatima Pillosu" userId="a6295d4dc9e22643" providerId="LiveId" clId="{E4EB9531-B35B-4F76-8762-A23C9D2F4928}" dt="2023-11-08T22:37:27.979" v="477" actId="12789"/>
+          <ac:spMkLst>
+            <pc:docMk/>
+            <pc:sldMk cId="1967199282" sldId="256"/>
+            <ac:spMk id="149" creationId="{B2D9AE0E-D7BB-624F-E92F-9B8205F1044A}"/>
+          </ac:spMkLst>
+        </pc:spChg>
+        <pc:spChg chg="del mod">
+          <ac:chgData name="Fatima Pillosu" userId="a6295d4dc9e22643" providerId="LiveId" clId="{E4EB9531-B35B-4F76-8762-A23C9D2F4928}" dt="2023-11-06T21:57:08.574" v="154" actId="21"/>
+          <ac:spMkLst>
+            <pc:docMk/>
+            <pc:sldMk cId="1967199282" sldId="256"/>
+            <ac:spMk id="170" creationId="{65D39ED4-F8A3-C14B-22AF-0DEE9CA3AFE3}"/>
+          </ac:spMkLst>
+        </pc:spChg>
+        <pc:spChg chg="add mod ord">
+          <ac:chgData name="Fatima Pillosu" userId="a6295d4dc9e22643" providerId="LiveId" clId="{E4EB9531-B35B-4F76-8762-A23C9D2F4928}" dt="2023-11-08T22:37:34.392" v="478" actId="12789"/>
+          <ac:spMkLst>
+            <pc:docMk/>
+            <pc:sldMk cId="1967199282" sldId="256"/>
+            <ac:spMk id="171" creationId="{D25BDD5B-14E5-0149-483D-A4306A0EC11C}"/>
+          </ac:spMkLst>
+        </pc:spChg>
+        <pc:spChg chg="del mod">
+          <ac:chgData name="Fatima Pillosu" userId="a6295d4dc9e22643" providerId="LiveId" clId="{E4EB9531-B35B-4F76-8762-A23C9D2F4928}" dt="2023-11-06T21:57:08.574" v="154" actId="21"/>
+          <ac:spMkLst>
+            <pc:docMk/>
+            <pc:sldMk cId="1967199282" sldId="256"/>
+            <ac:spMk id="172" creationId="{42716142-9967-2203-97F0-06AE13E4D758}"/>
+          </ac:spMkLst>
+        </pc:spChg>
+        <pc:spChg chg="del mod">
+          <ac:chgData name="Fatima Pillosu" userId="a6295d4dc9e22643" providerId="LiveId" clId="{E4EB9531-B35B-4F76-8762-A23C9D2F4928}" dt="2023-11-06T21:57:08.574" v="154" actId="21"/>
+          <ac:spMkLst>
+            <pc:docMk/>
+            <pc:sldMk cId="1967199282" sldId="256"/>
+            <ac:spMk id="173" creationId="{966A2799-3AB0-A0F4-8A9F-EC06112BD077}"/>
+          </ac:spMkLst>
+        </pc:spChg>
+        <pc:spChg chg="del mod">
+          <ac:chgData name="Fatima Pillosu" userId="a6295d4dc9e22643" providerId="LiveId" clId="{E4EB9531-B35B-4F76-8762-A23C9D2F4928}" dt="2023-11-06T21:57:08.574" v="154" actId="21"/>
+          <ac:spMkLst>
+            <pc:docMk/>
+            <pc:sldMk cId="1967199282" sldId="256"/>
+            <ac:spMk id="174" creationId="{14B2776F-0E30-2844-68CE-22C634A38F19}"/>
+          </ac:spMkLst>
+        </pc:spChg>
+        <pc:spChg chg="del mod">
+          <ac:chgData name="Fatima Pillosu" userId="a6295d4dc9e22643" providerId="LiveId" clId="{E4EB9531-B35B-4F76-8762-A23C9D2F4928}" dt="2023-11-06T21:57:08.574" v="154" actId="21"/>
+          <ac:spMkLst>
+            <pc:docMk/>
+            <pc:sldMk cId="1967199282" sldId="256"/>
+            <ac:spMk id="175" creationId="{ADFD0149-00D7-F2A5-3219-78AC3D4BE54F}"/>
+          </ac:spMkLst>
+        </pc:spChg>
+        <pc:spChg chg="del mod">
+          <ac:chgData name="Fatima Pillosu" userId="a6295d4dc9e22643" providerId="LiveId" clId="{E4EB9531-B35B-4F76-8762-A23C9D2F4928}" dt="2023-11-06T21:57:08.574" v="154" actId="21"/>
+          <ac:spMkLst>
+            <pc:docMk/>
+            <pc:sldMk cId="1967199282" sldId="256"/>
+            <ac:spMk id="176" creationId="{4CF3F799-3D8C-B40D-F644-A0D1052D25A0}"/>
+          </ac:spMkLst>
+        </pc:spChg>
+        <pc:spChg chg="del mod">
+          <ac:chgData name="Fatima Pillosu" userId="a6295d4dc9e22643" providerId="LiveId" clId="{E4EB9531-B35B-4F76-8762-A23C9D2F4928}" dt="2023-11-06T21:57:08.574" v="154" actId="21"/>
+          <ac:spMkLst>
+            <pc:docMk/>
+            <pc:sldMk cId="1967199282" sldId="256"/>
+            <ac:spMk id="177" creationId="{DA2FB7CB-64EB-FDD2-DC71-4AFE78BC8F2C}"/>
+          </ac:spMkLst>
+        </pc:spChg>
+        <pc:spChg chg="del mod">
+          <ac:chgData name="Fatima Pillosu" userId="a6295d4dc9e22643" providerId="LiveId" clId="{E4EB9531-B35B-4F76-8762-A23C9D2F4928}" dt="2023-11-06T21:57:08.574" v="154" actId="21"/>
+          <ac:spMkLst>
+            <pc:docMk/>
+            <pc:sldMk cId="1967199282" sldId="256"/>
+            <ac:spMk id="178" creationId="{2E2099F7-8694-FB42-8E9F-1D7A8F5F2226}"/>
+          </ac:spMkLst>
+        </pc:spChg>
+        <pc:spChg chg="del mod">
+          <ac:chgData name="Fatima Pillosu" userId="a6295d4dc9e22643" providerId="LiveId" clId="{E4EB9531-B35B-4F76-8762-A23C9D2F4928}" dt="2023-11-06T21:57:08.574" v="154" actId="21"/>
+          <ac:spMkLst>
+            <pc:docMk/>
+            <pc:sldMk cId="1967199282" sldId="256"/>
+            <ac:spMk id="179" creationId="{A0F38D58-1F24-6403-C793-6F1E1C076B7C}"/>
+          </ac:spMkLst>
+        </pc:spChg>
+        <pc:spChg chg="del mod">
+          <ac:chgData name="Fatima Pillosu" userId="a6295d4dc9e22643" providerId="LiveId" clId="{E4EB9531-B35B-4F76-8762-A23C9D2F4928}" dt="2023-11-06T21:57:08.574" v="154" actId="21"/>
+          <ac:spMkLst>
+            <pc:docMk/>
+            <pc:sldMk cId="1967199282" sldId="256"/>
+            <ac:spMk id="180" creationId="{FDA3EB20-4384-32BB-1F98-B88E5C9BB97F}"/>
+          </ac:spMkLst>
+        </pc:spChg>
+        <pc:spChg chg="del mod">
+          <ac:chgData name="Fatima Pillosu" userId="a6295d4dc9e22643" providerId="LiveId" clId="{E4EB9531-B35B-4F76-8762-A23C9D2F4928}" dt="2023-11-06T21:57:08.574" v="154" actId="21"/>
+          <ac:spMkLst>
+            <pc:docMk/>
+            <pc:sldMk cId="1967199282" sldId="256"/>
+            <ac:spMk id="181" creationId="{38EFEFFA-B1E5-1114-AFE3-FE71DA6934CA}"/>
+          </ac:spMkLst>
+        </pc:spChg>
+        <pc:spChg chg="del mod">
+          <ac:chgData name="Fatima Pillosu" userId="a6295d4dc9e22643" providerId="LiveId" clId="{E4EB9531-B35B-4F76-8762-A23C9D2F4928}" dt="2023-11-06T21:57:08.574" v="154" actId="21"/>
+          <ac:spMkLst>
+            <pc:docMk/>
+            <pc:sldMk cId="1967199282" sldId="256"/>
+            <ac:spMk id="182" creationId="{76895109-08D7-4A0D-BFF4-50D998E1BD5C}"/>
+          </ac:spMkLst>
+        </pc:spChg>
+        <pc:spChg chg="add mod ord">
+          <ac:chgData name="Fatima Pillosu" userId="a6295d4dc9e22643" providerId="LiveId" clId="{E4EB9531-B35B-4F76-8762-A23C9D2F4928}" dt="2023-11-08T22:37:20.565" v="476" actId="12788"/>
+          <ac:spMkLst>
+            <pc:docMk/>
+            <pc:sldMk cId="1967199282" sldId="256"/>
+            <ac:spMk id="183" creationId="{A453E47F-3351-19E4-61A6-33A31FA0DB01}"/>
+          </ac:spMkLst>
+        </pc:spChg>
+        <pc:spChg chg="add mod ord">
+          <ac:chgData name="Fatima Pillosu" userId="a6295d4dc9e22643" providerId="LiveId" clId="{E4EB9531-B35B-4F76-8762-A23C9D2F4928}" dt="2023-11-08T22:37:11.552" v="475" actId="12788"/>
+          <ac:spMkLst>
+            <pc:docMk/>
+            <pc:sldMk cId="1967199282" sldId="256"/>
+            <ac:spMk id="184" creationId="{06B4CEE1-3430-9BA3-6998-16C2EBB3D9B0}"/>
+          </ac:spMkLst>
+        </pc:spChg>
+        <pc:spChg chg="add mod ord">
+          <ac:chgData name="Fatima Pillosu" userId="a6295d4dc9e22643" providerId="LiveId" clId="{E4EB9531-B35B-4F76-8762-A23C9D2F4928}" dt="2023-11-08T22:38:03.625" v="497" actId="1036"/>
+          <ac:spMkLst>
+            <pc:docMk/>
+            <pc:sldMk cId="1967199282" sldId="256"/>
+            <ac:spMk id="185" creationId="{B5948A02-D18B-5E23-304A-5AB957798DB1}"/>
+          </ac:spMkLst>
+        </pc:spChg>
+        <pc:spChg chg="add mod ord">
+          <ac:chgData name="Fatima Pillosu" userId="a6295d4dc9e22643" providerId="LiveId" clId="{E4EB9531-B35B-4F76-8762-A23C9D2F4928}" dt="2023-11-08T22:37:55.834" v="491" actId="1036"/>
+          <ac:spMkLst>
+            <pc:docMk/>
+            <pc:sldMk cId="1967199282" sldId="256"/>
+            <ac:spMk id="186" creationId="{18AFC9C9-ED8B-D886-DAC0-623CF8736934}"/>
+          </ac:spMkLst>
+        </pc:spChg>
+        <pc:spChg chg="add mod ord">
+          <ac:chgData name="Fatima Pillosu" userId="a6295d4dc9e22643" providerId="LiveId" clId="{E4EB9531-B35B-4F76-8762-A23C9D2F4928}" dt="2023-11-08T22:38:11.079" v="509" actId="1037"/>
+          <ac:spMkLst>
+            <pc:docMk/>
+            <pc:sldMk cId="1967199282" sldId="256"/>
+            <ac:spMk id="187" creationId="{35202108-D28B-BD0D-CB90-3B190EAE4087}"/>
+          </ac:spMkLst>
+        </pc:spChg>
+        <pc:spChg chg="add mod ord">
+          <ac:chgData name="Fatima Pillosu" userId="a6295d4dc9e22643" providerId="LiveId" clId="{E4EB9531-B35B-4F76-8762-A23C9D2F4928}" dt="2023-11-08T22:38:19.835" v="515" actId="1037"/>
+          <ac:spMkLst>
+            <pc:docMk/>
+            <pc:sldMk cId="1967199282" sldId="256"/>
+            <ac:spMk id="188" creationId="{16140944-A7C1-A32B-8390-D386B3C88A3C}"/>
+          </ac:spMkLst>
+        </pc:spChg>
+        <pc:spChg chg="add del mod">
+          <ac:chgData name="Fatima Pillosu" userId="a6295d4dc9e22643" providerId="LiveId" clId="{E4EB9531-B35B-4F76-8762-A23C9D2F4928}" dt="2023-11-08T22:31:05.876" v="285" actId="478"/>
+          <ac:spMkLst>
+            <pc:docMk/>
+            <pc:sldMk cId="1967199282" sldId="256"/>
+            <ac:spMk id="189" creationId="{1D92883C-F747-A861-D0CF-F992EF569F00}"/>
+          </ac:spMkLst>
+        </pc:spChg>
+        <pc:spChg chg="add del mod">
+          <ac:chgData name="Fatima Pillosu" userId="a6295d4dc9e22643" providerId="LiveId" clId="{E4EB9531-B35B-4F76-8762-A23C9D2F4928}" dt="2023-11-08T22:31:07.747" v="286" actId="478"/>
+          <ac:spMkLst>
+            <pc:docMk/>
+            <pc:sldMk cId="1967199282" sldId="256"/>
+            <ac:spMk id="190" creationId="{1350C275-A6B7-25AF-80F7-AA1FB58163C2}"/>
+          </ac:spMkLst>
+        </pc:spChg>
+        <pc:spChg chg="add mod">
+          <ac:chgData name="Fatima Pillosu" userId="a6295d4dc9e22643" providerId="LiveId" clId="{E4EB9531-B35B-4F76-8762-A23C9D2F4928}" dt="2023-11-06T22:04:55.583" v="187" actId="20577"/>
+          <ac:spMkLst>
+            <pc:docMk/>
+            <pc:sldMk cId="1967199282" sldId="256"/>
+            <ac:spMk id="191" creationId="{C343795A-D142-7780-E8FD-873226AF1498}"/>
+          </ac:spMkLst>
+        </pc:spChg>
+        <pc:spChg chg="add mod">
+          <ac:chgData name="Fatima Pillosu" userId="a6295d4dc9e22643" providerId="LiveId" clId="{E4EB9531-B35B-4F76-8762-A23C9D2F4928}" dt="2023-11-06T22:04:58.798" v="188" actId="20577"/>
+          <ac:spMkLst>
+            <pc:docMk/>
+            <pc:sldMk cId="1967199282" sldId="256"/>
+            <ac:spMk id="192" creationId="{334701FB-F37F-59D7-16A5-C3FCEDD6EFE9}"/>
+          </ac:spMkLst>
+        </pc:spChg>
+        <pc:spChg chg="del mod">
+          <ac:chgData name="Fatima Pillosu" userId="a6295d4dc9e22643" providerId="LiveId" clId="{E4EB9531-B35B-4F76-8762-A23C9D2F4928}" dt="2023-11-06T21:57:08.574" v="154" actId="21"/>
+          <ac:spMkLst>
+            <pc:docMk/>
+            <pc:sldMk cId="1967199282" sldId="256"/>
+            <ac:spMk id="193" creationId="{9F3980BC-F57E-5B04-DFE2-10D351524428}"/>
+          </ac:spMkLst>
+        </pc:spChg>
+        <pc:spChg chg="add mod">
+          <ac:chgData name="Fatima Pillosu" userId="a6295d4dc9e22643" providerId="LiveId" clId="{E4EB9531-B35B-4F76-8762-A23C9D2F4928}" dt="2023-11-06T22:04:44.097" v="185" actId="20577"/>
+          <ac:spMkLst>
+            <pc:docMk/>
+            <pc:sldMk cId="1967199282" sldId="256"/>
+            <ac:spMk id="194" creationId="{605DDB0C-3D44-64B2-C042-AEE20DB4992A}"/>
+          </ac:spMkLst>
+        </pc:spChg>
+        <pc:spChg chg="add mod">
+          <ac:chgData name="Fatima Pillosu" userId="a6295d4dc9e22643" providerId="LiveId" clId="{E4EB9531-B35B-4F76-8762-A23C9D2F4928}" dt="2023-11-06T22:04:51.281" v="186" actId="20577"/>
+          <ac:spMkLst>
+            <pc:docMk/>
+            <pc:sldMk cId="1967199282" sldId="256"/>
+            <ac:spMk id="195" creationId="{1F31019E-E1EA-0DC9-13A6-01B9B6FC23B3}"/>
+          </ac:spMkLst>
+        </pc:spChg>
         <pc:spChg chg="add mod">
           <ac:chgData name="Fatima Pillosu" userId="a6295d4dc9e22643" providerId="LiveId" clId="{E4EB9531-B35B-4F76-8762-A23C9D2F4928}" dt="2023-11-06T21:57:52.980" v="155"/>
           <ac:spMkLst>
             <pc:docMk/>
             <pc:sldMk cId="1967199282" sldId="256"/>
-            <ac:spMk id="149" creationId="{B2D9AE0E-D7BB-624F-E92F-9B8205F1044A}"/>
-          </ac:spMkLst>
-        </pc:spChg>
-        <pc:spChg chg="del mod">
-          <ac:chgData name="Fatima Pillosu" userId="a6295d4dc9e22643" providerId="LiveId" clId="{E4EB9531-B35B-4F76-8762-A23C9D2F4928}" dt="2023-11-06T21:57:08.574" v="154" actId="21"/>
-          <ac:spMkLst>
-            <pc:docMk/>
-            <pc:sldMk cId="1967199282" sldId="256"/>
-            <ac:spMk id="170" creationId="{65D39ED4-F8A3-C14B-22AF-0DEE9CA3AFE3}"/>
+            <ac:spMk id="196" creationId="{904A04A7-F9EC-3E5F-6FDA-6ADE37B3AEBF}"/>
           </ac:spMkLst>
         </pc:spChg>
         <pc:spChg chg="add mod">
@@ -964,95 +1172,7 @@
           <ac:spMkLst>
             <pc:docMk/>
             <pc:sldMk cId="1967199282" sldId="256"/>
-            <ac:spMk id="171" creationId="{D25BDD5B-14E5-0149-483D-A4306A0EC11C}"/>
-          </ac:spMkLst>
-        </pc:spChg>
-        <pc:spChg chg="del mod">
-          <ac:chgData name="Fatima Pillosu" userId="a6295d4dc9e22643" providerId="LiveId" clId="{E4EB9531-B35B-4F76-8762-A23C9D2F4928}" dt="2023-11-06T21:57:08.574" v="154" actId="21"/>
-          <ac:spMkLst>
-            <pc:docMk/>
-            <pc:sldMk cId="1967199282" sldId="256"/>
-            <ac:spMk id="172" creationId="{42716142-9967-2203-97F0-06AE13E4D758}"/>
-          </ac:spMkLst>
-        </pc:spChg>
-        <pc:spChg chg="del mod">
-          <ac:chgData name="Fatima Pillosu" userId="a6295d4dc9e22643" providerId="LiveId" clId="{E4EB9531-B35B-4F76-8762-A23C9D2F4928}" dt="2023-11-06T21:57:08.574" v="154" actId="21"/>
-          <ac:spMkLst>
-            <pc:docMk/>
-            <pc:sldMk cId="1967199282" sldId="256"/>
-            <ac:spMk id="173" creationId="{966A2799-3AB0-A0F4-8A9F-EC06112BD077}"/>
-          </ac:spMkLst>
-        </pc:spChg>
-        <pc:spChg chg="del mod">
-          <ac:chgData name="Fatima Pillosu" userId="a6295d4dc9e22643" providerId="LiveId" clId="{E4EB9531-B35B-4F76-8762-A23C9D2F4928}" dt="2023-11-06T21:57:08.574" v="154" actId="21"/>
-          <ac:spMkLst>
-            <pc:docMk/>
-            <pc:sldMk cId="1967199282" sldId="256"/>
-            <ac:spMk id="174" creationId="{14B2776F-0E30-2844-68CE-22C634A38F19}"/>
-          </ac:spMkLst>
-        </pc:spChg>
-        <pc:spChg chg="del mod">
-          <ac:chgData name="Fatima Pillosu" userId="a6295d4dc9e22643" providerId="LiveId" clId="{E4EB9531-B35B-4F76-8762-A23C9D2F4928}" dt="2023-11-06T21:57:08.574" v="154" actId="21"/>
-          <ac:spMkLst>
-            <pc:docMk/>
-            <pc:sldMk cId="1967199282" sldId="256"/>
-            <ac:spMk id="175" creationId="{ADFD0149-00D7-F2A5-3219-78AC3D4BE54F}"/>
-          </ac:spMkLst>
-        </pc:spChg>
-        <pc:spChg chg="del mod">
-          <ac:chgData name="Fatima Pillosu" userId="a6295d4dc9e22643" providerId="LiveId" clId="{E4EB9531-B35B-4F76-8762-A23C9D2F4928}" dt="2023-11-06T21:57:08.574" v="154" actId="21"/>
-          <ac:spMkLst>
-            <pc:docMk/>
-            <pc:sldMk cId="1967199282" sldId="256"/>
-            <ac:spMk id="176" creationId="{4CF3F799-3D8C-B40D-F644-A0D1052D25A0}"/>
-          </ac:spMkLst>
-        </pc:spChg>
-        <pc:spChg chg="del mod">
-          <ac:chgData name="Fatima Pillosu" userId="a6295d4dc9e22643" providerId="LiveId" clId="{E4EB9531-B35B-4F76-8762-A23C9D2F4928}" dt="2023-11-06T21:57:08.574" v="154" actId="21"/>
-          <ac:spMkLst>
-            <pc:docMk/>
-            <pc:sldMk cId="1967199282" sldId="256"/>
-            <ac:spMk id="177" creationId="{DA2FB7CB-64EB-FDD2-DC71-4AFE78BC8F2C}"/>
-          </ac:spMkLst>
-        </pc:spChg>
-        <pc:spChg chg="del mod">
-          <ac:chgData name="Fatima Pillosu" userId="a6295d4dc9e22643" providerId="LiveId" clId="{E4EB9531-B35B-4F76-8762-A23C9D2F4928}" dt="2023-11-06T21:57:08.574" v="154" actId="21"/>
-          <ac:spMkLst>
-            <pc:docMk/>
-            <pc:sldMk cId="1967199282" sldId="256"/>
-            <ac:spMk id="178" creationId="{2E2099F7-8694-FB42-8E9F-1D7A8F5F2226}"/>
-          </ac:spMkLst>
-        </pc:spChg>
-        <pc:spChg chg="del mod">
-          <ac:chgData name="Fatima Pillosu" userId="a6295d4dc9e22643" providerId="LiveId" clId="{E4EB9531-B35B-4F76-8762-A23C9D2F4928}" dt="2023-11-06T21:57:08.574" v="154" actId="21"/>
-          <ac:spMkLst>
-            <pc:docMk/>
-            <pc:sldMk cId="1967199282" sldId="256"/>
-            <ac:spMk id="179" creationId="{A0F38D58-1F24-6403-C793-6F1E1C076B7C}"/>
-          </ac:spMkLst>
-        </pc:spChg>
-        <pc:spChg chg="del mod">
-          <ac:chgData name="Fatima Pillosu" userId="a6295d4dc9e22643" providerId="LiveId" clId="{E4EB9531-B35B-4F76-8762-A23C9D2F4928}" dt="2023-11-06T21:57:08.574" v="154" actId="21"/>
-          <ac:spMkLst>
-            <pc:docMk/>
-            <pc:sldMk cId="1967199282" sldId="256"/>
-            <ac:spMk id="180" creationId="{FDA3EB20-4384-32BB-1F98-B88E5C9BB97F}"/>
-          </ac:spMkLst>
-        </pc:spChg>
-        <pc:spChg chg="del mod">
-          <ac:chgData name="Fatima Pillosu" userId="a6295d4dc9e22643" providerId="LiveId" clId="{E4EB9531-B35B-4F76-8762-A23C9D2F4928}" dt="2023-11-06T21:57:08.574" v="154" actId="21"/>
-          <ac:spMkLst>
-            <pc:docMk/>
-            <pc:sldMk cId="1967199282" sldId="256"/>
-            <ac:spMk id="181" creationId="{38EFEFFA-B1E5-1114-AFE3-FE71DA6934CA}"/>
-          </ac:spMkLst>
-        </pc:spChg>
-        <pc:spChg chg="del mod">
-          <ac:chgData name="Fatima Pillosu" userId="a6295d4dc9e22643" providerId="LiveId" clId="{E4EB9531-B35B-4F76-8762-A23C9D2F4928}" dt="2023-11-06T21:57:08.574" v="154" actId="21"/>
-          <ac:spMkLst>
-            <pc:docMk/>
-            <pc:sldMk cId="1967199282" sldId="256"/>
-            <ac:spMk id="182" creationId="{76895109-08D7-4A0D-BFF4-50D998E1BD5C}"/>
+            <ac:spMk id="197" creationId="{EC01617F-732E-9D71-9CD0-9D2A18EEA276}"/>
           </ac:spMkLst>
         </pc:spChg>
         <pc:spChg chg="add mod">
@@ -1060,7 +1180,7 @@
           <ac:spMkLst>
             <pc:docMk/>
             <pc:sldMk cId="1967199282" sldId="256"/>
-            <ac:spMk id="183" creationId="{A453E47F-3351-19E4-61A6-33A31FA0DB01}"/>
+            <ac:spMk id="202" creationId="{0908367B-CB7D-DE33-34B0-FCF15457A03E}"/>
           </ac:spMkLst>
         </pc:spChg>
         <pc:spChg chg="add mod">
@@ -1068,39 +1188,7 @@
           <ac:spMkLst>
             <pc:docMk/>
             <pc:sldMk cId="1967199282" sldId="256"/>
-            <ac:spMk id="184" creationId="{06B4CEE1-3430-9BA3-6998-16C2EBB3D9B0}"/>
-          </ac:spMkLst>
-        </pc:spChg>
-        <pc:spChg chg="add mod">
-          <ac:chgData name="Fatima Pillosu" userId="a6295d4dc9e22643" providerId="LiveId" clId="{E4EB9531-B35B-4F76-8762-A23C9D2F4928}" dt="2023-11-06T22:05:26.143" v="193" actId="20577"/>
-          <ac:spMkLst>
-            <pc:docMk/>
-            <pc:sldMk cId="1967199282" sldId="256"/>
-            <ac:spMk id="185" creationId="{B5948A02-D18B-5E23-304A-5AB957798DB1}"/>
-          </ac:spMkLst>
-        </pc:spChg>
-        <pc:spChg chg="add mod">
-          <ac:chgData name="Fatima Pillosu" userId="a6295d4dc9e22643" providerId="LiveId" clId="{E4EB9531-B35B-4F76-8762-A23C9D2F4928}" dt="2023-11-06T22:05:35.324" v="195" actId="20577"/>
-          <ac:spMkLst>
-            <pc:docMk/>
-            <pc:sldMk cId="1967199282" sldId="256"/>
-            <ac:spMk id="186" creationId="{18AFC9C9-ED8B-D886-DAC0-623CF8736934}"/>
-          </ac:spMkLst>
-        </pc:spChg>
-        <pc:spChg chg="add mod">
-          <ac:chgData name="Fatima Pillosu" userId="a6295d4dc9e22643" providerId="LiveId" clId="{E4EB9531-B35B-4F76-8762-A23C9D2F4928}" dt="2023-11-06T22:05:30.841" v="194" actId="20577"/>
-          <ac:spMkLst>
-            <pc:docMk/>
-            <pc:sldMk cId="1967199282" sldId="256"/>
-            <ac:spMk id="187" creationId="{35202108-D28B-BD0D-CB90-3B190EAE4087}"/>
-          </ac:spMkLst>
-        </pc:spChg>
-        <pc:spChg chg="add mod">
-          <ac:chgData name="Fatima Pillosu" userId="a6295d4dc9e22643" providerId="LiveId" clId="{E4EB9531-B35B-4F76-8762-A23C9D2F4928}" dt="2023-11-06T22:05:41.502" v="197" actId="6549"/>
-          <ac:spMkLst>
-            <pc:docMk/>
-            <pc:sldMk cId="1967199282" sldId="256"/>
-            <ac:spMk id="188" creationId="{16140944-A7C1-A32B-8390-D386B3C88A3C}"/>
+            <ac:spMk id="204" creationId="{9D45E2E3-73F2-F901-120B-64DF112945F0}"/>
           </ac:spMkLst>
         </pc:spChg>
         <pc:spChg chg="add mod">
@@ -1108,7 +1196,7 @@
           <ac:spMkLst>
             <pc:docMk/>
             <pc:sldMk cId="1967199282" sldId="256"/>
-            <ac:spMk id="189" creationId="{1D92883C-F747-A861-D0CF-F992EF569F00}"/>
+            <ac:spMk id="206" creationId="{1347BA48-9623-DC3B-5B6A-0F7557D8D0D1}"/>
           </ac:spMkLst>
         </pc:spChg>
         <pc:spChg chg="add mod">
@@ -1116,47 +1204,7 @@
           <ac:spMkLst>
             <pc:docMk/>
             <pc:sldMk cId="1967199282" sldId="256"/>
-            <ac:spMk id="190" creationId="{1350C275-A6B7-25AF-80F7-AA1FB58163C2}"/>
-          </ac:spMkLst>
-        </pc:spChg>
-        <pc:spChg chg="add mod">
-          <ac:chgData name="Fatima Pillosu" userId="a6295d4dc9e22643" providerId="LiveId" clId="{E4EB9531-B35B-4F76-8762-A23C9D2F4928}" dt="2023-11-06T22:04:55.583" v="187" actId="20577"/>
-          <ac:spMkLst>
-            <pc:docMk/>
-            <pc:sldMk cId="1967199282" sldId="256"/>
-            <ac:spMk id="191" creationId="{C343795A-D142-7780-E8FD-873226AF1498}"/>
-          </ac:spMkLst>
-        </pc:spChg>
-        <pc:spChg chg="add mod">
-          <ac:chgData name="Fatima Pillosu" userId="a6295d4dc9e22643" providerId="LiveId" clId="{E4EB9531-B35B-4F76-8762-A23C9D2F4928}" dt="2023-11-06T22:04:58.798" v="188" actId="20577"/>
-          <ac:spMkLst>
-            <pc:docMk/>
-            <pc:sldMk cId="1967199282" sldId="256"/>
-            <ac:spMk id="192" creationId="{334701FB-F37F-59D7-16A5-C3FCEDD6EFE9}"/>
-          </ac:spMkLst>
-        </pc:spChg>
-        <pc:spChg chg="del mod">
-          <ac:chgData name="Fatima Pillosu" userId="a6295d4dc9e22643" providerId="LiveId" clId="{E4EB9531-B35B-4F76-8762-A23C9D2F4928}" dt="2023-11-06T21:57:08.574" v="154" actId="21"/>
-          <ac:spMkLst>
-            <pc:docMk/>
-            <pc:sldMk cId="1967199282" sldId="256"/>
-            <ac:spMk id="193" creationId="{9F3980BC-F57E-5B04-DFE2-10D351524428}"/>
-          </ac:spMkLst>
-        </pc:spChg>
-        <pc:spChg chg="add mod">
-          <ac:chgData name="Fatima Pillosu" userId="a6295d4dc9e22643" providerId="LiveId" clId="{E4EB9531-B35B-4F76-8762-A23C9D2F4928}" dt="2023-11-06T22:04:44.097" v="185" actId="20577"/>
-          <ac:spMkLst>
-            <pc:docMk/>
-            <pc:sldMk cId="1967199282" sldId="256"/>
-            <ac:spMk id="194" creationId="{605DDB0C-3D44-64B2-C042-AEE20DB4992A}"/>
-          </ac:spMkLst>
-        </pc:spChg>
-        <pc:spChg chg="add mod">
-          <ac:chgData name="Fatima Pillosu" userId="a6295d4dc9e22643" providerId="LiveId" clId="{E4EB9531-B35B-4F76-8762-A23C9D2F4928}" dt="2023-11-06T22:04:51.281" v="186" actId="20577"/>
-          <ac:spMkLst>
-            <pc:docMk/>
-            <pc:sldMk cId="1967199282" sldId="256"/>
-            <ac:spMk id="195" creationId="{1F31019E-E1EA-0DC9-13A6-01B9B6FC23B3}"/>
+            <ac:spMk id="207" creationId="{8166618B-EE67-66F3-B5C2-4AC765456585}"/>
           </ac:spMkLst>
         </pc:spChg>
         <pc:spChg chg="add mod">
@@ -1164,7 +1212,7 @@
           <ac:spMkLst>
             <pc:docMk/>
             <pc:sldMk cId="1967199282" sldId="256"/>
-            <ac:spMk id="196" creationId="{904A04A7-F9EC-3E5F-6FDA-6ADE37B3AEBF}"/>
+            <ac:spMk id="209" creationId="{5CAA5678-E621-66FD-4C54-1823DEDAE08A}"/>
           </ac:spMkLst>
         </pc:spChg>
         <pc:spChg chg="add mod">
@@ -1172,7 +1220,15 @@
           <ac:spMkLst>
             <pc:docMk/>
             <pc:sldMk cId="1967199282" sldId="256"/>
-            <ac:spMk id="197" creationId="{EC01617F-732E-9D71-9CD0-9D2A18EEA276}"/>
+            <ac:spMk id="211" creationId="{AA4F8BC5-6199-927C-AFCF-194F3EE87B56}"/>
+          </ac:spMkLst>
+        </pc:spChg>
+        <pc:spChg chg="add mod">
+          <ac:chgData name="Fatima Pillosu" userId="a6295d4dc9e22643" providerId="LiveId" clId="{E4EB9531-B35B-4F76-8762-A23C9D2F4928}" dt="2023-11-06T22:19:50.996" v="252" actId="20577"/>
+          <ac:spMkLst>
+            <pc:docMk/>
+            <pc:sldMk cId="1967199282" sldId="256"/>
+            <ac:spMk id="213" creationId="{96819079-C410-571A-23BA-1255B3406EBA}"/>
           </ac:spMkLst>
         </pc:spChg>
         <pc:spChg chg="add mod">
@@ -1180,7 +1236,23 @@
           <ac:spMkLst>
             <pc:docMk/>
             <pc:sldMk cId="1967199282" sldId="256"/>
-            <ac:spMk id="202" creationId="{0908367B-CB7D-DE33-34B0-FCF15457A03E}"/>
+            <ac:spMk id="214" creationId="{FD660FE0-B155-ECEE-F878-158B3D176F9E}"/>
+          </ac:spMkLst>
+        </pc:spChg>
+        <pc:spChg chg="del mod">
+          <ac:chgData name="Fatima Pillosu" userId="a6295d4dc9e22643" providerId="LiveId" clId="{E4EB9531-B35B-4F76-8762-A23C9D2F4928}" dt="2023-11-06T21:57:08.574" v="154" actId="21"/>
+          <ac:spMkLst>
+            <pc:docMk/>
+            <pc:sldMk cId="1967199282" sldId="256"/>
+            <ac:spMk id="215" creationId="{F1687572-8FDF-FBEB-C6E2-2C57F38769A6}"/>
+          </ac:spMkLst>
+        </pc:spChg>
+        <pc:spChg chg="del mod">
+          <ac:chgData name="Fatima Pillosu" userId="a6295d4dc9e22643" providerId="LiveId" clId="{E4EB9531-B35B-4F76-8762-A23C9D2F4928}" dt="2023-11-06T21:57:08.574" v="154" actId="21"/>
+          <ac:spMkLst>
+            <pc:docMk/>
+            <pc:sldMk cId="1967199282" sldId="256"/>
+            <ac:spMk id="216" creationId="{817DBE9C-B6CF-7BA8-69A2-0D67D16B1299}"/>
           </ac:spMkLst>
         </pc:spChg>
         <pc:spChg chg="add mod">
@@ -1188,7 +1260,7 @@
           <ac:spMkLst>
             <pc:docMk/>
             <pc:sldMk cId="1967199282" sldId="256"/>
-            <ac:spMk id="204" creationId="{9D45E2E3-73F2-F901-120B-64DF112945F0}"/>
+            <ac:spMk id="217" creationId="{D985EC4B-FCC1-B499-0272-A088EDDF0EE3}"/>
           </ac:spMkLst>
         </pc:spChg>
         <pc:spChg chg="add mod">
@@ -1196,7 +1268,23 @@
           <ac:spMkLst>
             <pc:docMk/>
             <pc:sldMk cId="1967199282" sldId="256"/>
-            <ac:spMk id="206" creationId="{1347BA48-9623-DC3B-5B6A-0F7557D8D0D1}"/>
+            <ac:spMk id="218" creationId="{5E2CF87B-B8C7-EF73-D1CB-3C34E6D53E90}"/>
+          </ac:spMkLst>
+        </pc:spChg>
+        <pc:spChg chg="del mod">
+          <ac:chgData name="Fatima Pillosu" userId="a6295d4dc9e22643" providerId="LiveId" clId="{E4EB9531-B35B-4F76-8762-A23C9D2F4928}" dt="2023-11-06T21:57:08.574" v="154" actId="21"/>
+          <ac:spMkLst>
+            <pc:docMk/>
+            <pc:sldMk cId="1967199282" sldId="256"/>
+            <ac:spMk id="219" creationId="{FEFC8D04-5FEE-9018-3257-E2DE5461EB23}"/>
+          </ac:spMkLst>
+        </pc:spChg>
+        <pc:spChg chg="del mod">
+          <ac:chgData name="Fatima Pillosu" userId="a6295d4dc9e22643" providerId="LiveId" clId="{E4EB9531-B35B-4F76-8762-A23C9D2F4928}" dt="2023-11-06T21:57:08.574" v="154" actId="21"/>
+          <ac:spMkLst>
+            <pc:docMk/>
+            <pc:sldMk cId="1967199282" sldId="256"/>
+            <ac:spMk id="220" creationId="{33610B7E-7EE0-B4D2-16CF-A3F1836646C6}"/>
           </ac:spMkLst>
         </pc:spChg>
         <pc:spChg chg="add mod">
@@ -1204,7 +1292,15 @@
           <ac:spMkLst>
             <pc:docMk/>
             <pc:sldMk cId="1967199282" sldId="256"/>
-            <ac:spMk id="207" creationId="{8166618B-EE67-66F3-B5C2-4AC765456585}"/>
+            <ac:spMk id="221" creationId="{12A06669-7737-8D97-FFB9-B5874BF3C186}"/>
+          </ac:spMkLst>
+        </pc:spChg>
+        <pc:spChg chg="del mod">
+          <ac:chgData name="Fatima Pillosu" userId="a6295d4dc9e22643" providerId="LiveId" clId="{E4EB9531-B35B-4F76-8762-A23C9D2F4928}" dt="2023-11-06T21:57:08.574" v="154" actId="21"/>
+          <ac:spMkLst>
+            <pc:docMk/>
+            <pc:sldMk cId="1967199282" sldId="256"/>
+            <ac:spMk id="222" creationId="{A3696A1C-06D1-5092-425F-68C6DDCD3E34}"/>
           </ac:spMkLst>
         </pc:spChg>
         <pc:spChg chg="add mod">
@@ -1212,7 +1308,7 @@
           <ac:spMkLst>
             <pc:docMk/>
             <pc:sldMk cId="1967199282" sldId="256"/>
-            <ac:spMk id="209" creationId="{5CAA5678-E621-66FD-4C54-1823DEDAE08A}"/>
+            <ac:spMk id="223" creationId="{994F977A-166E-9A29-550B-9F1CF9C2AE92}"/>
           </ac:spMkLst>
         </pc:spChg>
         <pc:spChg chg="add mod">
@@ -1220,15 +1316,7 @@
           <ac:spMkLst>
             <pc:docMk/>
             <pc:sldMk cId="1967199282" sldId="256"/>
-            <ac:spMk id="211" creationId="{AA4F8BC5-6199-927C-AFCF-194F3EE87B56}"/>
-          </ac:spMkLst>
-        </pc:spChg>
-        <pc:spChg chg="add mod">
-          <ac:chgData name="Fatima Pillosu" userId="a6295d4dc9e22643" providerId="LiveId" clId="{E4EB9531-B35B-4F76-8762-A23C9D2F4928}" dt="2023-11-06T22:19:50.996" v="252" actId="20577"/>
-          <ac:spMkLst>
-            <pc:docMk/>
-            <pc:sldMk cId="1967199282" sldId="256"/>
-            <ac:spMk id="213" creationId="{96819079-C410-571A-23BA-1255B3406EBA}"/>
+            <ac:spMk id="224" creationId="{26A7E600-A472-B544-4700-8FF9F440A6D2}"/>
           </ac:spMkLst>
         </pc:spChg>
         <pc:spChg chg="add mod">
@@ -1236,7 +1324,7 @@
           <ac:spMkLst>
             <pc:docMk/>
             <pc:sldMk cId="1967199282" sldId="256"/>
-            <ac:spMk id="214" creationId="{FD660FE0-B155-ECEE-F878-158B3D176F9E}"/>
+            <ac:spMk id="225" creationId="{A8AF641A-60E5-74F6-20E7-21D72FBC0C4B}"/>
           </ac:spMkLst>
         </pc:spChg>
         <pc:spChg chg="del mod">
@@ -1244,7 +1332,7 @@
           <ac:spMkLst>
             <pc:docMk/>
             <pc:sldMk cId="1967199282" sldId="256"/>
-            <ac:spMk id="215" creationId="{F1687572-8FDF-FBEB-C6E2-2C57F38769A6}"/>
+            <ac:spMk id="226" creationId="{919BDD2A-6741-BEB2-50F7-9F66A79E73F6}"/>
           </ac:spMkLst>
         </pc:spChg>
         <pc:spChg chg="del mod">
@@ -1252,7 +1340,15 @@
           <ac:spMkLst>
             <pc:docMk/>
             <pc:sldMk cId="1967199282" sldId="256"/>
-            <ac:spMk id="216" creationId="{817DBE9C-B6CF-7BA8-69A2-0D67D16B1299}"/>
+            <ac:spMk id="227" creationId="{F87B32F0-10BB-7906-E66D-6DC50C8A69FE}"/>
+          </ac:spMkLst>
+        </pc:spChg>
+        <pc:spChg chg="del mod">
+          <ac:chgData name="Fatima Pillosu" userId="a6295d4dc9e22643" providerId="LiveId" clId="{E4EB9531-B35B-4F76-8762-A23C9D2F4928}" dt="2023-11-06T21:57:08.574" v="154" actId="21"/>
+          <ac:spMkLst>
+            <pc:docMk/>
+            <pc:sldMk cId="1967199282" sldId="256"/>
+            <ac:spMk id="228" creationId="{C377B023-BE74-E4B3-668D-910593D85F13}"/>
           </ac:spMkLst>
         </pc:spChg>
         <pc:spChg chg="add mod">
@@ -1260,7 +1356,231 @@
           <ac:spMkLst>
             <pc:docMk/>
             <pc:sldMk cId="1967199282" sldId="256"/>
-            <ac:spMk id="217" creationId="{D985EC4B-FCC1-B499-0272-A088EDDF0EE3}"/>
+            <ac:spMk id="229" creationId="{724968AA-6C60-4DF7-759A-CFFE6B1FAB0C}"/>
+          </ac:spMkLst>
+        </pc:spChg>
+        <pc:spChg chg="del mod">
+          <ac:chgData name="Fatima Pillosu" userId="a6295d4dc9e22643" providerId="LiveId" clId="{E4EB9531-B35B-4F76-8762-A23C9D2F4928}" dt="2023-11-06T21:57:08.574" v="154" actId="21"/>
+          <ac:spMkLst>
+            <pc:docMk/>
+            <pc:sldMk cId="1967199282" sldId="256"/>
+            <ac:spMk id="230" creationId="{976CB684-B768-9BA2-A408-45760BF62D6C}"/>
+          </ac:spMkLst>
+        </pc:spChg>
+        <pc:spChg chg="del mod">
+          <ac:chgData name="Fatima Pillosu" userId="a6295d4dc9e22643" providerId="LiveId" clId="{E4EB9531-B35B-4F76-8762-A23C9D2F4928}" dt="2023-11-06T21:57:08.574" v="154" actId="21"/>
+          <ac:spMkLst>
+            <pc:docMk/>
+            <pc:sldMk cId="1967199282" sldId="256"/>
+            <ac:spMk id="231" creationId="{1579A008-2D87-8C02-8C25-8FDAC31C16DE}"/>
+          </ac:spMkLst>
+        </pc:spChg>
+        <pc:spChg chg="del mod">
+          <ac:chgData name="Fatima Pillosu" userId="a6295d4dc9e22643" providerId="LiveId" clId="{E4EB9531-B35B-4F76-8762-A23C9D2F4928}" dt="2023-11-06T21:57:08.574" v="154" actId="21"/>
+          <ac:spMkLst>
+            <pc:docMk/>
+            <pc:sldMk cId="1967199282" sldId="256"/>
+            <ac:spMk id="232" creationId="{8BFC2C92-09A6-4D86-210D-61C0B1A8EB99}"/>
+          </ac:spMkLst>
+        </pc:spChg>
+        <pc:spChg chg="del mod">
+          <ac:chgData name="Fatima Pillosu" userId="a6295d4dc9e22643" providerId="LiveId" clId="{E4EB9531-B35B-4F76-8762-A23C9D2F4928}" dt="2023-11-06T21:57:08.574" v="154" actId="21"/>
+          <ac:spMkLst>
+            <pc:docMk/>
+            <pc:sldMk cId="1967199282" sldId="256"/>
+            <ac:spMk id="233" creationId="{16F53EE7-4241-43C5-8227-15E653609E1B}"/>
+          </ac:spMkLst>
+        </pc:spChg>
+        <pc:spChg chg="del mod">
+          <ac:chgData name="Fatima Pillosu" userId="a6295d4dc9e22643" providerId="LiveId" clId="{E4EB9531-B35B-4F76-8762-A23C9D2F4928}" dt="2023-11-06T21:57:08.574" v="154" actId="21"/>
+          <ac:spMkLst>
+            <pc:docMk/>
+            <pc:sldMk cId="1967199282" sldId="256"/>
+            <ac:spMk id="234" creationId="{0B45ACD5-E320-98D7-0149-BCBD90B505BD}"/>
+          </ac:spMkLst>
+        </pc:spChg>
+        <pc:spChg chg="del mod">
+          <ac:chgData name="Fatima Pillosu" userId="a6295d4dc9e22643" providerId="LiveId" clId="{E4EB9531-B35B-4F76-8762-A23C9D2F4928}" dt="2023-11-06T21:57:08.574" v="154" actId="21"/>
+          <ac:spMkLst>
+            <pc:docMk/>
+            <pc:sldMk cId="1967199282" sldId="256"/>
+            <ac:spMk id="235" creationId="{39BF293F-DF52-61BA-416A-5195AA32E4A5}"/>
+          </ac:spMkLst>
+        </pc:spChg>
+        <pc:spChg chg="del mod">
+          <ac:chgData name="Fatima Pillosu" userId="a6295d4dc9e22643" providerId="LiveId" clId="{E4EB9531-B35B-4F76-8762-A23C9D2F4928}" dt="2023-11-06T21:57:08.574" v="154" actId="21"/>
+          <ac:spMkLst>
+            <pc:docMk/>
+            <pc:sldMk cId="1967199282" sldId="256"/>
+            <ac:spMk id="236" creationId="{DF56D9EA-9DD1-FD36-96FB-4CC4F503381D}"/>
+          </ac:spMkLst>
+        </pc:spChg>
+        <pc:spChg chg="del mod">
+          <ac:chgData name="Fatima Pillosu" userId="a6295d4dc9e22643" providerId="LiveId" clId="{E4EB9531-B35B-4F76-8762-A23C9D2F4928}" dt="2023-11-06T21:57:08.574" v="154" actId="21"/>
+          <ac:spMkLst>
+            <pc:docMk/>
+            <pc:sldMk cId="1967199282" sldId="256"/>
+            <ac:spMk id="237" creationId="{618BABE2-380F-6EEC-A58A-9E5757536952}"/>
+          </ac:spMkLst>
+        </pc:spChg>
+        <pc:spChg chg="add mod">
+          <ac:chgData name="Fatima Pillosu" userId="a6295d4dc9e22643" providerId="LiveId" clId="{E4EB9531-B35B-4F76-8762-A23C9D2F4928}" dt="2023-11-06T22:20:01.082" v="270" actId="20577"/>
+          <ac:spMkLst>
+            <pc:docMk/>
+            <pc:sldMk cId="1967199282" sldId="256"/>
+            <ac:spMk id="238" creationId="{B5C86E7B-F2E1-8CC8-71D1-1660F634D915}"/>
+          </ac:spMkLst>
+        </pc:spChg>
+        <pc:spChg chg="del mod">
+          <ac:chgData name="Fatima Pillosu" userId="a6295d4dc9e22643" providerId="LiveId" clId="{E4EB9531-B35B-4F76-8762-A23C9D2F4928}" dt="2023-11-06T21:57:08.574" v="154" actId="21"/>
+          <ac:spMkLst>
+            <pc:docMk/>
+            <pc:sldMk cId="1967199282" sldId="256"/>
+            <ac:spMk id="239" creationId="{E6ECB808-CE47-1B2E-936A-3C8126CACE63}"/>
+          </ac:spMkLst>
+        </pc:spChg>
+        <pc:spChg chg="del mod">
+          <ac:chgData name="Fatima Pillosu" userId="a6295d4dc9e22643" providerId="LiveId" clId="{E4EB9531-B35B-4F76-8762-A23C9D2F4928}" dt="2023-11-06T21:57:08.574" v="154" actId="21"/>
+          <ac:spMkLst>
+            <pc:docMk/>
+            <pc:sldMk cId="1967199282" sldId="256"/>
+            <ac:spMk id="240" creationId="{54C69D8F-D08D-94E2-573D-B33990C5F556}"/>
+          </ac:spMkLst>
+        </pc:spChg>
+        <pc:spChg chg="del mod">
+          <ac:chgData name="Fatima Pillosu" userId="a6295d4dc9e22643" providerId="LiveId" clId="{E4EB9531-B35B-4F76-8762-A23C9D2F4928}" dt="2023-11-06T21:57:08.574" v="154" actId="21"/>
+          <ac:spMkLst>
+            <pc:docMk/>
+            <pc:sldMk cId="1967199282" sldId="256"/>
+            <ac:spMk id="241" creationId="{E14407A9-E0C0-14C7-4127-548017D2C936}"/>
+          </ac:spMkLst>
+        </pc:spChg>
+        <pc:spChg chg="del mod">
+          <ac:chgData name="Fatima Pillosu" userId="a6295d4dc9e22643" providerId="LiveId" clId="{E4EB9531-B35B-4F76-8762-A23C9D2F4928}" dt="2023-11-06T21:57:08.574" v="154" actId="21"/>
+          <ac:spMkLst>
+            <pc:docMk/>
+            <pc:sldMk cId="1967199282" sldId="256"/>
+            <ac:spMk id="242" creationId="{F6BD6F39-4FDD-6BA4-1949-37ACBAF2F220}"/>
+          </ac:spMkLst>
+        </pc:spChg>
+        <pc:spChg chg="del mod">
+          <ac:chgData name="Fatima Pillosu" userId="a6295d4dc9e22643" providerId="LiveId" clId="{E4EB9531-B35B-4F76-8762-A23C9D2F4928}" dt="2023-11-06T21:57:08.574" v="154" actId="21"/>
+          <ac:spMkLst>
+            <pc:docMk/>
+            <pc:sldMk cId="1967199282" sldId="256"/>
+            <ac:spMk id="243" creationId="{09EAFF7B-6826-C5E9-2AD1-DD484098C5AA}"/>
+          </ac:spMkLst>
+        </pc:spChg>
+        <pc:spChg chg="del mod">
+          <ac:chgData name="Fatima Pillosu" userId="a6295d4dc9e22643" providerId="LiveId" clId="{E4EB9531-B35B-4F76-8762-A23C9D2F4928}" dt="2023-11-06T21:57:08.574" v="154" actId="21"/>
+          <ac:spMkLst>
+            <pc:docMk/>
+            <pc:sldMk cId="1967199282" sldId="256"/>
+            <ac:spMk id="244" creationId="{739AADE5-A6E7-4E30-1EEF-EF3297E17387}"/>
+          </ac:spMkLst>
+        </pc:spChg>
+        <pc:spChg chg="del mod">
+          <ac:chgData name="Fatima Pillosu" userId="a6295d4dc9e22643" providerId="LiveId" clId="{E4EB9531-B35B-4F76-8762-A23C9D2F4928}" dt="2023-11-06T21:57:08.574" v="154" actId="21"/>
+          <ac:spMkLst>
+            <pc:docMk/>
+            <pc:sldMk cId="1967199282" sldId="256"/>
+            <ac:spMk id="245" creationId="{227BDC41-DAB0-F94F-5357-D9310BADDE43}"/>
+          </ac:spMkLst>
+        </pc:spChg>
+        <pc:spChg chg="del mod">
+          <ac:chgData name="Fatima Pillosu" userId="a6295d4dc9e22643" providerId="LiveId" clId="{E4EB9531-B35B-4F76-8762-A23C9D2F4928}" dt="2023-11-06T21:57:08.574" v="154" actId="21"/>
+          <ac:spMkLst>
+            <pc:docMk/>
+            <pc:sldMk cId="1967199282" sldId="256"/>
+            <ac:spMk id="246" creationId="{776F067F-81D1-BD8F-3DE6-C4AED0D10471}"/>
+          </ac:spMkLst>
+        </pc:spChg>
+        <pc:spChg chg="del mod">
+          <ac:chgData name="Fatima Pillosu" userId="a6295d4dc9e22643" providerId="LiveId" clId="{E4EB9531-B35B-4F76-8762-A23C9D2F4928}" dt="2023-11-06T21:57:08.574" v="154" actId="21"/>
+          <ac:spMkLst>
+            <pc:docMk/>
+            <pc:sldMk cId="1967199282" sldId="256"/>
+            <ac:spMk id="247" creationId="{C35FBDE3-802C-2914-538A-241070C9B5E7}"/>
+          </ac:spMkLst>
+        </pc:spChg>
+        <pc:spChg chg="del mod">
+          <ac:chgData name="Fatima Pillosu" userId="a6295d4dc9e22643" providerId="LiveId" clId="{E4EB9531-B35B-4F76-8762-A23C9D2F4928}" dt="2023-11-06T21:57:08.574" v="154" actId="21"/>
+          <ac:spMkLst>
+            <pc:docMk/>
+            <pc:sldMk cId="1967199282" sldId="256"/>
+            <ac:spMk id="248" creationId="{890A47F5-3735-EEBF-2B6B-CAD901900997}"/>
+          </ac:spMkLst>
+        </pc:spChg>
+        <pc:spChg chg="del mod">
+          <ac:chgData name="Fatima Pillosu" userId="a6295d4dc9e22643" providerId="LiveId" clId="{E4EB9531-B35B-4F76-8762-A23C9D2F4928}" dt="2023-11-06T21:57:08.574" v="154" actId="21"/>
+          <ac:spMkLst>
+            <pc:docMk/>
+            <pc:sldMk cId="1967199282" sldId="256"/>
+            <ac:spMk id="249" creationId="{9CAEA0B3-C65A-CCFA-0F76-97F2D3B3E47A}"/>
+          </ac:spMkLst>
+        </pc:spChg>
+        <pc:spChg chg="del mod">
+          <ac:chgData name="Fatima Pillosu" userId="a6295d4dc9e22643" providerId="LiveId" clId="{E4EB9531-B35B-4F76-8762-A23C9D2F4928}" dt="2023-11-06T21:57:08.574" v="154" actId="21"/>
+          <ac:spMkLst>
+            <pc:docMk/>
+            <pc:sldMk cId="1967199282" sldId="256"/>
+            <ac:spMk id="250" creationId="{D078396E-A377-5A71-73C8-936698F4CD19}"/>
+          </ac:spMkLst>
+        </pc:spChg>
+        <pc:spChg chg="del mod">
+          <ac:chgData name="Fatima Pillosu" userId="a6295d4dc9e22643" providerId="LiveId" clId="{E4EB9531-B35B-4F76-8762-A23C9D2F4928}" dt="2023-11-06T21:57:08.574" v="154" actId="21"/>
+          <ac:spMkLst>
+            <pc:docMk/>
+            <pc:sldMk cId="1967199282" sldId="256"/>
+            <ac:spMk id="251" creationId="{D5C22EE7-D54B-CF9B-E085-D69C02A05A13}"/>
+          </ac:spMkLst>
+        </pc:spChg>
+        <pc:spChg chg="del mod">
+          <ac:chgData name="Fatima Pillosu" userId="a6295d4dc9e22643" providerId="LiveId" clId="{E4EB9531-B35B-4F76-8762-A23C9D2F4928}" dt="2023-11-06T21:57:08.574" v="154" actId="21"/>
+          <ac:spMkLst>
+            <pc:docMk/>
+            <pc:sldMk cId="1967199282" sldId="256"/>
+            <ac:spMk id="252" creationId="{374D5227-B8F4-57B7-8B84-3E3E74E48970}"/>
+          </ac:spMkLst>
+        </pc:spChg>
+        <pc:spChg chg="del mod">
+          <ac:chgData name="Fatima Pillosu" userId="a6295d4dc9e22643" providerId="LiveId" clId="{E4EB9531-B35B-4F76-8762-A23C9D2F4928}" dt="2023-11-06T21:57:08.574" v="154" actId="21"/>
+          <ac:spMkLst>
+            <pc:docMk/>
+            <pc:sldMk cId="1967199282" sldId="256"/>
+            <ac:spMk id="253" creationId="{0BE0D2A8-C151-4A2C-B3EF-8C81AFF0BA36}"/>
+          </ac:spMkLst>
+        </pc:spChg>
+        <pc:spChg chg="del mod">
+          <ac:chgData name="Fatima Pillosu" userId="a6295d4dc9e22643" providerId="LiveId" clId="{E4EB9531-B35B-4F76-8762-A23C9D2F4928}" dt="2023-11-06T21:57:08.574" v="154" actId="21"/>
+          <ac:spMkLst>
+            <pc:docMk/>
+            <pc:sldMk cId="1967199282" sldId="256"/>
+            <ac:spMk id="254" creationId="{0E48E4EC-C16D-86BA-6B5F-5BE870A5F89F}"/>
+          </ac:spMkLst>
+        </pc:spChg>
+        <pc:spChg chg="del mod">
+          <ac:chgData name="Fatima Pillosu" userId="a6295d4dc9e22643" providerId="LiveId" clId="{E4EB9531-B35B-4F76-8762-A23C9D2F4928}" dt="2023-11-06T21:57:08.574" v="154" actId="21"/>
+          <ac:spMkLst>
+            <pc:docMk/>
+            <pc:sldMk cId="1967199282" sldId="256"/>
+            <ac:spMk id="255" creationId="{EB567113-64AD-A75E-82C3-AC8DCF388F3D}"/>
+          </ac:spMkLst>
+        </pc:spChg>
+        <pc:spChg chg="del mod">
+          <ac:chgData name="Fatima Pillosu" userId="a6295d4dc9e22643" providerId="LiveId" clId="{E4EB9531-B35B-4F76-8762-A23C9D2F4928}" dt="2023-11-06T21:57:08.574" v="154" actId="21"/>
+          <ac:spMkLst>
+            <pc:docMk/>
+            <pc:sldMk cId="1967199282" sldId="256"/>
+            <ac:spMk id="256" creationId="{B62BEE55-838F-0DEE-4C9C-9A043DAF50DB}"/>
+          </ac:spMkLst>
+        </pc:spChg>
+        <pc:spChg chg="del mod">
+          <ac:chgData name="Fatima Pillosu" userId="a6295d4dc9e22643" providerId="LiveId" clId="{E4EB9531-B35B-4F76-8762-A23C9D2F4928}" dt="2023-11-06T21:57:08.574" v="154" actId="21"/>
+          <ac:spMkLst>
+            <pc:docMk/>
+            <pc:sldMk cId="1967199282" sldId="256"/>
+            <ac:spMk id="257" creationId="{D5201F61-8DC6-DC55-555C-2AA6472F2DF3}"/>
           </ac:spMkLst>
         </pc:spChg>
         <pc:spChg chg="add mod">
@@ -1268,23 +1588,7 @@
           <ac:spMkLst>
             <pc:docMk/>
             <pc:sldMk cId="1967199282" sldId="256"/>
-            <ac:spMk id="218" creationId="{5E2CF87B-B8C7-EF73-D1CB-3C34E6D53E90}"/>
-          </ac:spMkLst>
-        </pc:spChg>
-        <pc:spChg chg="del mod">
-          <ac:chgData name="Fatima Pillosu" userId="a6295d4dc9e22643" providerId="LiveId" clId="{E4EB9531-B35B-4F76-8762-A23C9D2F4928}" dt="2023-11-06T21:57:08.574" v="154" actId="21"/>
-          <ac:spMkLst>
-            <pc:docMk/>
-            <pc:sldMk cId="1967199282" sldId="256"/>
-            <ac:spMk id="219" creationId="{FEFC8D04-5FEE-9018-3257-E2DE5461EB23}"/>
-          </ac:spMkLst>
-        </pc:spChg>
-        <pc:spChg chg="del mod">
-          <ac:chgData name="Fatima Pillosu" userId="a6295d4dc9e22643" providerId="LiveId" clId="{E4EB9531-B35B-4F76-8762-A23C9D2F4928}" dt="2023-11-06T21:57:08.574" v="154" actId="21"/>
-          <ac:spMkLst>
-            <pc:docMk/>
-            <pc:sldMk cId="1967199282" sldId="256"/>
-            <ac:spMk id="220" creationId="{33610B7E-7EE0-B4D2-16CF-A3F1836646C6}"/>
+            <ac:spMk id="260" creationId="{1E5BA1C2-2028-5318-7810-4B48EA78FEEA}"/>
           </ac:spMkLst>
         </pc:spChg>
         <pc:spChg chg="add mod">
@@ -1292,15 +1596,7 @@
           <ac:spMkLst>
             <pc:docMk/>
             <pc:sldMk cId="1967199282" sldId="256"/>
-            <ac:spMk id="221" creationId="{12A06669-7737-8D97-FFB9-B5874BF3C186}"/>
-          </ac:spMkLst>
-        </pc:spChg>
-        <pc:spChg chg="del mod">
-          <ac:chgData name="Fatima Pillosu" userId="a6295d4dc9e22643" providerId="LiveId" clId="{E4EB9531-B35B-4F76-8762-A23C9D2F4928}" dt="2023-11-06T21:57:08.574" v="154" actId="21"/>
-          <ac:spMkLst>
-            <pc:docMk/>
-            <pc:sldMk cId="1967199282" sldId="256"/>
-            <ac:spMk id="222" creationId="{A3696A1C-06D1-5092-425F-68C6DDCD3E34}"/>
+            <ac:spMk id="261" creationId="{2451CFC0-DC5E-FEDA-C5D0-8DD328643A73}"/>
           </ac:spMkLst>
         </pc:spChg>
         <pc:spChg chg="add mod">
@@ -1308,7 +1604,7 @@
           <ac:spMkLst>
             <pc:docMk/>
             <pc:sldMk cId="1967199282" sldId="256"/>
-            <ac:spMk id="223" creationId="{994F977A-166E-9A29-550B-9F1CF9C2AE92}"/>
+            <ac:spMk id="262" creationId="{21FE2E6D-5E01-4F48-E3E9-740DAA4C7A43}"/>
           </ac:spMkLst>
         </pc:spChg>
         <pc:spChg chg="add mod">
@@ -1316,7 +1612,87 @@
           <ac:spMkLst>
             <pc:docMk/>
             <pc:sldMk cId="1967199282" sldId="256"/>
-            <ac:spMk id="224" creationId="{26A7E600-A472-B544-4700-8FF9F440A6D2}"/>
+            <ac:spMk id="264" creationId="{78F31C95-F3D0-6ADA-D4CF-AC0BA5D58FC8}"/>
+          </ac:spMkLst>
+        </pc:spChg>
+        <pc:spChg chg="del mod">
+          <ac:chgData name="Fatima Pillosu" userId="a6295d4dc9e22643" providerId="LiveId" clId="{E4EB9531-B35B-4F76-8762-A23C9D2F4928}" dt="2023-11-06T21:57:08.574" v="154" actId="21"/>
+          <ac:spMkLst>
+            <pc:docMk/>
+            <pc:sldMk cId="1967199282" sldId="256"/>
+            <ac:spMk id="267" creationId="{A528C180-F9E4-ADA5-CB22-0F1DDAC74562}"/>
+          </ac:spMkLst>
+        </pc:spChg>
+        <pc:spChg chg="del mod">
+          <ac:chgData name="Fatima Pillosu" userId="a6295d4dc9e22643" providerId="LiveId" clId="{E4EB9531-B35B-4F76-8762-A23C9D2F4928}" dt="2023-11-06T21:57:08.574" v="154" actId="21"/>
+          <ac:spMkLst>
+            <pc:docMk/>
+            <pc:sldMk cId="1967199282" sldId="256"/>
+            <ac:spMk id="268" creationId="{DA892BFD-0AF2-8478-BD33-1ED7E8FD0460}"/>
+          </ac:spMkLst>
+        </pc:spChg>
+        <pc:spChg chg="del mod">
+          <ac:chgData name="Fatima Pillosu" userId="a6295d4dc9e22643" providerId="LiveId" clId="{E4EB9531-B35B-4F76-8762-A23C9D2F4928}" dt="2023-11-06T21:57:08.574" v="154" actId="21"/>
+          <ac:spMkLst>
+            <pc:docMk/>
+            <pc:sldMk cId="1967199282" sldId="256"/>
+            <ac:spMk id="269" creationId="{BFAEBAF0-FCD8-5141-B043-736D20F16E41}"/>
+          </ac:spMkLst>
+        </pc:spChg>
+        <pc:spChg chg="del mod">
+          <ac:chgData name="Fatima Pillosu" userId="a6295d4dc9e22643" providerId="LiveId" clId="{E4EB9531-B35B-4F76-8762-A23C9D2F4928}" dt="2023-11-06T21:57:08.574" v="154" actId="21"/>
+          <ac:spMkLst>
+            <pc:docMk/>
+            <pc:sldMk cId="1967199282" sldId="256"/>
+            <ac:spMk id="270" creationId="{A8786CD5-04A2-817C-19B6-DEBC50A16D07}"/>
+          </ac:spMkLst>
+        </pc:spChg>
+        <pc:spChg chg="del mod">
+          <ac:chgData name="Fatima Pillosu" userId="a6295d4dc9e22643" providerId="LiveId" clId="{E4EB9531-B35B-4F76-8762-A23C9D2F4928}" dt="2023-11-06T21:57:08.574" v="154" actId="21"/>
+          <ac:spMkLst>
+            <pc:docMk/>
+            <pc:sldMk cId="1967199282" sldId="256"/>
+            <ac:spMk id="271" creationId="{5AC9C89B-BA5A-E6D0-9B29-C896DCBCED67}"/>
+          </ac:spMkLst>
+        </pc:spChg>
+        <pc:spChg chg="del mod">
+          <ac:chgData name="Fatima Pillosu" userId="a6295d4dc9e22643" providerId="LiveId" clId="{E4EB9531-B35B-4F76-8762-A23C9D2F4928}" dt="2023-11-06T21:57:08.574" v="154" actId="21"/>
+          <ac:spMkLst>
+            <pc:docMk/>
+            <pc:sldMk cId="1967199282" sldId="256"/>
+            <ac:spMk id="272" creationId="{E351EFDD-3FE1-F190-8AB6-624E250C6ED1}"/>
+          </ac:spMkLst>
+        </pc:spChg>
+        <pc:spChg chg="del mod">
+          <ac:chgData name="Fatima Pillosu" userId="a6295d4dc9e22643" providerId="LiveId" clId="{E4EB9531-B35B-4F76-8762-A23C9D2F4928}" dt="2023-11-06T21:57:08.574" v="154" actId="21"/>
+          <ac:spMkLst>
+            <pc:docMk/>
+            <pc:sldMk cId="1967199282" sldId="256"/>
+            <ac:spMk id="273" creationId="{D654CA22-146C-71EB-0731-8DC06B7AEE31}"/>
+          </ac:spMkLst>
+        </pc:spChg>
+        <pc:spChg chg="del mod">
+          <ac:chgData name="Fatima Pillosu" userId="a6295d4dc9e22643" providerId="LiveId" clId="{E4EB9531-B35B-4F76-8762-A23C9D2F4928}" dt="2023-11-06T21:57:08.574" v="154" actId="21"/>
+          <ac:spMkLst>
+            <pc:docMk/>
+            <pc:sldMk cId="1967199282" sldId="256"/>
+            <ac:spMk id="274" creationId="{7EE71E49-043F-82D8-2A0C-B76C1DA664F1}"/>
+          </ac:spMkLst>
+        </pc:spChg>
+        <pc:spChg chg="del mod">
+          <ac:chgData name="Fatima Pillosu" userId="a6295d4dc9e22643" providerId="LiveId" clId="{E4EB9531-B35B-4F76-8762-A23C9D2F4928}" dt="2023-11-06T21:57:08.574" v="154" actId="21"/>
+          <ac:spMkLst>
+            <pc:docMk/>
+            <pc:sldMk cId="1967199282" sldId="256"/>
+            <ac:spMk id="275" creationId="{48767C8C-3E90-3188-FD4F-E142AB62976E}"/>
+          </ac:spMkLst>
+        </pc:spChg>
+        <pc:spChg chg="add mod">
+          <ac:chgData name="Fatima Pillosu" userId="a6295d4dc9e22643" providerId="LiveId" clId="{E4EB9531-B35B-4F76-8762-A23C9D2F4928}" dt="2023-11-06T22:19:36.932" v="234" actId="20577"/>
+          <ac:spMkLst>
+            <pc:docMk/>
+            <pc:sldMk cId="1967199282" sldId="256"/>
+            <ac:spMk id="276" creationId="{9C07D085-9018-45D7-4E21-4213FB6AD6E4}"/>
           </ac:spMkLst>
         </pc:spChg>
         <pc:spChg chg="add mod">
@@ -1324,387 +1700,11 @@
           <ac:spMkLst>
             <pc:docMk/>
             <pc:sldMk cId="1967199282" sldId="256"/>
-            <ac:spMk id="225" creationId="{A8AF641A-60E5-74F6-20E7-21D72FBC0C4B}"/>
-          </ac:spMkLst>
-        </pc:spChg>
-        <pc:spChg chg="del mod">
-          <ac:chgData name="Fatima Pillosu" userId="a6295d4dc9e22643" providerId="LiveId" clId="{E4EB9531-B35B-4F76-8762-A23C9D2F4928}" dt="2023-11-06T21:57:08.574" v="154" actId="21"/>
-          <ac:spMkLst>
-            <pc:docMk/>
-            <pc:sldMk cId="1967199282" sldId="256"/>
-            <ac:spMk id="226" creationId="{919BDD2A-6741-BEB2-50F7-9F66A79E73F6}"/>
-          </ac:spMkLst>
-        </pc:spChg>
-        <pc:spChg chg="del mod">
-          <ac:chgData name="Fatima Pillosu" userId="a6295d4dc9e22643" providerId="LiveId" clId="{E4EB9531-B35B-4F76-8762-A23C9D2F4928}" dt="2023-11-06T21:57:08.574" v="154" actId="21"/>
-          <ac:spMkLst>
-            <pc:docMk/>
-            <pc:sldMk cId="1967199282" sldId="256"/>
-            <ac:spMk id="227" creationId="{F87B32F0-10BB-7906-E66D-6DC50C8A69FE}"/>
-          </ac:spMkLst>
-        </pc:spChg>
-        <pc:spChg chg="del mod">
-          <ac:chgData name="Fatima Pillosu" userId="a6295d4dc9e22643" providerId="LiveId" clId="{E4EB9531-B35B-4F76-8762-A23C9D2F4928}" dt="2023-11-06T21:57:08.574" v="154" actId="21"/>
-          <ac:spMkLst>
-            <pc:docMk/>
-            <pc:sldMk cId="1967199282" sldId="256"/>
-            <ac:spMk id="228" creationId="{C377B023-BE74-E4B3-668D-910593D85F13}"/>
+            <ac:spMk id="278" creationId="{134F1432-58E2-3A01-EC87-C158ECC7EA92}"/>
           </ac:spMkLst>
         </pc:spChg>
         <pc:spChg chg="add mod">
-          <ac:chgData name="Fatima Pillosu" userId="a6295d4dc9e22643" providerId="LiveId" clId="{E4EB9531-B35B-4F76-8762-A23C9D2F4928}" dt="2023-11-06T21:57:52.980" v="155"/>
-          <ac:spMkLst>
-            <pc:docMk/>
-            <pc:sldMk cId="1967199282" sldId="256"/>
-            <ac:spMk id="229" creationId="{724968AA-6C60-4DF7-759A-CFFE6B1FAB0C}"/>
-          </ac:spMkLst>
-        </pc:spChg>
-        <pc:spChg chg="del mod">
-          <ac:chgData name="Fatima Pillosu" userId="a6295d4dc9e22643" providerId="LiveId" clId="{E4EB9531-B35B-4F76-8762-A23C9D2F4928}" dt="2023-11-06T21:57:08.574" v="154" actId="21"/>
-          <ac:spMkLst>
-            <pc:docMk/>
-            <pc:sldMk cId="1967199282" sldId="256"/>
-            <ac:spMk id="230" creationId="{976CB684-B768-9BA2-A408-45760BF62D6C}"/>
-          </ac:spMkLst>
-        </pc:spChg>
-        <pc:spChg chg="del mod">
-          <ac:chgData name="Fatima Pillosu" userId="a6295d4dc9e22643" providerId="LiveId" clId="{E4EB9531-B35B-4F76-8762-A23C9D2F4928}" dt="2023-11-06T21:57:08.574" v="154" actId="21"/>
-          <ac:spMkLst>
-            <pc:docMk/>
-            <pc:sldMk cId="1967199282" sldId="256"/>
-            <ac:spMk id="231" creationId="{1579A008-2D87-8C02-8C25-8FDAC31C16DE}"/>
-          </ac:spMkLst>
-        </pc:spChg>
-        <pc:spChg chg="del mod">
-          <ac:chgData name="Fatima Pillosu" userId="a6295d4dc9e22643" providerId="LiveId" clId="{E4EB9531-B35B-4F76-8762-A23C9D2F4928}" dt="2023-11-06T21:57:08.574" v="154" actId="21"/>
-          <ac:spMkLst>
-            <pc:docMk/>
-            <pc:sldMk cId="1967199282" sldId="256"/>
-            <ac:spMk id="232" creationId="{8BFC2C92-09A6-4D86-210D-61C0B1A8EB99}"/>
-          </ac:spMkLst>
-        </pc:spChg>
-        <pc:spChg chg="del mod">
-          <ac:chgData name="Fatima Pillosu" userId="a6295d4dc9e22643" providerId="LiveId" clId="{E4EB9531-B35B-4F76-8762-A23C9D2F4928}" dt="2023-11-06T21:57:08.574" v="154" actId="21"/>
-          <ac:spMkLst>
-            <pc:docMk/>
-            <pc:sldMk cId="1967199282" sldId="256"/>
-            <ac:spMk id="233" creationId="{16F53EE7-4241-43C5-8227-15E653609E1B}"/>
-          </ac:spMkLst>
-        </pc:spChg>
-        <pc:spChg chg="del mod">
-          <ac:chgData name="Fatima Pillosu" userId="a6295d4dc9e22643" providerId="LiveId" clId="{E4EB9531-B35B-4F76-8762-A23C9D2F4928}" dt="2023-11-06T21:57:08.574" v="154" actId="21"/>
-          <ac:spMkLst>
-            <pc:docMk/>
-            <pc:sldMk cId="1967199282" sldId="256"/>
-            <ac:spMk id="234" creationId="{0B45ACD5-E320-98D7-0149-BCBD90B505BD}"/>
-          </ac:spMkLst>
-        </pc:spChg>
-        <pc:spChg chg="del mod">
-          <ac:chgData name="Fatima Pillosu" userId="a6295d4dc9e22643" providerId="LiveId" clId="{E4EB9531-B35B-4F76-8762-A23C9D2F4928}" dt="2023-11-06T21:57:08.574" v="154" actId="21"/>
-          <ac:spMkLst>
-            <pc:docMk/>
-            <pc:sldMk cId="1967199282" sldId="256"/>
-            <ac:spMk id="235" creationId="{39BF293F-DF52-61BA-416A-5195AA32E4A5}"/>
-          </ac:spMkLst>
-        </pc:spChg>
-        <pc:spChg chg="del mod">
-          <ac:chgData name="Fatima Pillosu" userId="a6295d4dc9e22643" providerId="LiveId" clId="{E4EB9531-B35B-4F76-8762-A23C9D2F4928}" dt="2023-11-06T21:57:08.574" v="154" actId="21"/>
-          <ac:spMkLst>
-            <pc:docMk/>
-            <pc:sldMk cId="1967199282" sldId="256"/>
-            <ac:spMk id="236" creationId="{DF56D9EA-9DD1-FD36-96FB-4CC4F503381D}"/>
-          </ac:spMkLst>
-        </pc:spChg>
-        <pc:spChg chg="del mod">
-          <ac:chgData name="Fatima Pillosu" userId="a6295d4dc9e22643" providerId="LiveId" clId="{E4EB9531-B35B-4F76-8762-A23C9D2F4928}" dt="2023-11-06T21:57:08.574" v="154" actId="21"/>
-          <ac:spMkLst>
-            <pc:docMk/>
-            <pc:sldMk cId="1967199282" sldId="256"/>
-            <ac:spMk id="237" creationId="{618BABE2-380F-6EEC-A58A-9E5757536952}"/>
-          </ac:spMkLst>
-        </pc:spChg>
-        <pc:spChg chg="add mod">
-          <ac:chgData name="Fatima Pillosu" userId="a6295d4dc9e22643" providerId="LiveId" clId="{E4EB9531-B35B-4F76-8762-A23C9D2F4928}" dt="2023-11-06T22:20:01.082" v="270" actId="20577"/>
-          <ac:spMkLst>
-            <pc:docMk/>
-            <pc:sldMk cId="1967199282" sldId="256"/>
-            <ac:spMk id="238" creationId="{B5C86E7B-F2E1-8CC8-71D1-1660F634D915}"/>
-          </ac:spMkLst>
-        </pc:spChg>
-        <pc:spChg chg="del mod">
-          <ac:chgData name="Fatima Pillosu" userId="a6295d4dc9e22643" providerId="LiveId" clId="{E4EB9531-B35B-4F76-8762-A23C9D2F4928}" dt="2023-11-06T21:57:08.574" v="154" actId="21"/>
-          <ac:spMkLst>
-            <pc:docMk/>
-            <pc:sldMk cId="1967199282" sldId="256"/>
-            <ac:spMk id="239" creationId="{E6ECB808-CE47-1B2E-936A-3C8126CACE63}"/>
-          </ac:spMkLst>
-        </pc:spChg>
-        <pc:spChg chg="del mod">
-          <ac:chgData name="Fatima Pillosu" userId="a6295d4dc9e22643" providerId="LiveId" clId="{E4EB9531-B35B-4F76-8762-A23C9D2F4928}" dt="2023-11-06T21:57:08.574" v="154" actId="21"/>
-          <ac:spMkLst>
-            <pc:docMk/>
-            <pc:sldMk cId="1967199282" sldId="256"/>
-            <ac:spMk id="240" creationId="{54C69D8F-D08D-94E2-573D-B33990C5F556}"/>
-          </ac:spMkLst>
-        </pc:spChg>
-        <pc:spChg chg="del mod">
-          <ac:chgData name="Fatima Pillosu" userId="a6295d4dc9e22643" providerId="LiveId" clId="{E4EB9531-B35B-4F76-8762-A23C9D2F4928}" dt="2023-11-06T21:57:08.574" v="154" actId="21"/>
-          <ac:spMkLst>
-            <pc:docMk/>
-            <pc:sldMk cId="1967199282" sldId="256"/>
-            <ac:spMk id="241" creationId="{E14407A9-E0C0-14C7-4127-548017D2C936}"/>
-          </ac:spMkLst>
-        </pc:spChg>
-        <pc:spChg chg="del mod">
-          <ac:chgData name="Fatima Pillosu" userId="a6295d4dc9e22643" providerId="LiveId" clId="{E4EB9531-B35B-4F76-8762-A23C9D2F4928}" dt="2023-11-06T21:57:08.574" v="154" actId="21"/>
-          <ac:spMkLst>
-            <pc:docMk/>
-            <pc:sldMk cId="1967199282" sldId="256"/>
-            <ac:spMk id="242" creationId="{F6BD6F39-4FDD-6BA4-1949-37ACBAF2F220}"/>
-          </ac:spMkLst>
-        </pc:spChg>
-        <pc:spChg chg="del mod">
-          <ac:chgData name="Fatima Pillosu" userId="a6295d4dc9e22643" providerId="LiveId" clId="{E4EB9531-B35B-4F76-8762-A23C9D2F4928}" dt="2023-11-06T21:57:08.574" v="154" actId="21"/>
-          <ac:spMkLst>
-            <pc:docMk/>
-            <pc:sldMk cId="1967199282" sldId="256"/>
-            <ac:spMk id="243" creationId="{09EAFF7B-6826-C5E9-2AD1-DD484098C5AA}"/>
-          </ac:spMkLst>
-        </pc:spChg>
-        <pc:spChg chg="del mod">
-          <ac:chgData name="Fatima Pillosu" userId="a6295d4dc9e22643" providerId="LiveId" clId="{E4EB9531-B35B-4F76-8762-A23C9D2F4928}" dt="2023-11-06T21:57:08.574" v="154" actId="21"/>
-          <ac:spMkLst>
-            <pc:docMk/>
-            <pc:sldMk cId="1967199282" sldId="256"/>
-            <ac:spMk id="244" creationId="{739AADE5-A6E7-4E30-1EEF-EF3297E17387}"/>
-          </ac:spMkLst>
-        </pc:spChg>
-        <pc:spChg chg="del mod">
-          <ac:chgData name="Fatima Pillosu" userId="a6295d4dc9e22643" providerId="LiveId" clId="{E4EB9531-B35B-4F76-8762-A23C9D2F4928}" dt="2023-11-06T21:57:08.574" v="154" actId="21"/>
-          <ac:spMkLst>
-            <pc:docMk/>
-            <pc:sldMk cId="1967199282" sldId="256"/>
-            <ac:spMk id="245" creationId="{227BDC41-DAB0-F94F-5357-D9310BADDE43}"/>
-          </ac:spMkLst>
-        </pc:spChg>
-        <pc:spChg chg="del mod">
-          <ac:chgData name="Fatima Pillosu" userId="a6295d4dc9e22643" providerId="LiveId" clId="{E4EB9531-B35B-4F76-8762-A23C9D2F4928}" dt="2023-11-06T21:57:08.574" v="154" actId="21"/>
-          <ac:spMkLst>
-            <pc:docMk/>
-            <pc:sldMk cId="1967199282" sldId="256"/>
-            <ac:spMk id="246" creationId="{776F067F-81D1-BD8F-3DE6-C4AED0D10471}"/>
-          </ac:spMkLst>
-        </pc:spChg>
-        <pc:spChg chg="del mod">
-          <ac:chgData name="Fatima Pillosu" userId="a6295d4dc9e22643" providerId="LiveId" clId="{E4EB9531-B35B-4F76-8762-A23C9D2F4928}" dt="2023-11-06T21:57:08.574" v="154" actId="21"/>
-          <ac:spMkLst>
-            <pc:docMk/>
-            <pc:sldMk cId="1967199282" sldId="256"/>
-            <ac:spMk id="247" creationId="{C35FBDE3-802C-2914-538A-241070C9B5E7}"/>
-          </ac:spMkLst>
-        </pc:spChg>
-        <pc:spChg chg="del mod">
-          <ac:chgData name="Fatima Pillosu" userId="a6295d4dc9e22643" providerId="LiveId" clId="{E4EB9531-B35B-4F76-8762-A23C9D2F4928}" dt="2023-11-06T21:57:08.574" v="154" actId="21"/>
-          <ac:spMkLst>
-            <pc:docMk/>
-            <pc:sldMk cId="1967199282" sldId="256"/>
-            <ac:spMk id="248" creationId="{890A47F5-3735-EEBF-2B6B-CAD901900997}"/>
-          </ac:spMkLst>
-        </pc:spChg>
-        <pc:spChg chg="del mod">
-          <ac:chgData name="Fatima Pillosu" userId="a6295d4dc9e22643" providerId="LiveId" clId="{E4EB9531-B35B-4F76-8762-A23C9D2F4928}" dt="2023-11-06T21:57:08.574" v="154" actId="21"/>
-          <ac:spMkLst>
-            <pc:docMk/>
-            <pc:sldMk cId="1967199282" sldId="256"/>
-            <ac:spMk id="249" creationId="{9CAEA0B3-C65A-CCFA-0F76-97F2D3B3E47A}"/>
-          </ac:spMkLst>
-        </pc:spChg>
-        <pc:spChg chg="del mod">
-          <ac:chgData name="Fatima Pillosu" userId="a6295d4dc9e22643" providerId="LiveId" clId="{E4EB9531-B35B-4F76-8762-A23C9D2F4928}" dt="2023-11-06T21:57:08.574" v="154" actId="21"/>
-          <ac:spMkLst>
-            <pc:docMk/>
-            <pc:sldMk cId="1967199282" sldId="256"/>
-            <ac:spMk id="250" creationId="{D078396E-A377-5A71-73C8-936698F4CD19}"/>
-          </ac:spMkLst>
-        </pc:spChg>
-        <pc:spChg chg="del mod">
-          <ac:chgData name="Fatima Pillosu" userId="a6295d4dc9e22643" providerId="LiveId" clId="{E4EB9531-B35B-4F76-8762-A23C9D2F4928}" dt="2023-11-06T21:57:08.574" v="154" actId="21"/>
-          <ac:spMkLst>
-            <pc:docMk/>
-            <pc:sldMk cId="1967199282" sldId="256"/>
-            <ac:spMk id="251" creationId="{D5C22EE7-D54B-CF9B-E085-D69C02A05A13}"/>
-          </ac:spMkLst>
-        </pc:spChg>
-        <pc:spChg chg="del mod">
-          <ac:chgData name="Fatima Pillosu" userId="a6295d4dc9e22643" providerId="LiveId" clId="{E4EB9531-B35B-4F76-8762-A23C9D2F4928}" dt="2023-11-06T21:57:08.574" v="154" actId="21"/>
-          <ac:spMkLst>
-            <pc:docMk/>
-            <pc:sldMk cId="1967199282" sldId="256"/>
-            <ac:spMk id="252" creationId="{374D5227-B8F4-57B7-8B84-3E3E74E48970}"/>
-          </ac:spMkLst>
-        </pc:spChg>
-        <pc:spChg chg="del mod">
-          <ac:chgData name="Fatima Pillosu" userId="a6295d4dc9e22643" providerId="LiveId" clId="{E4EB9531-B35B-4F76-8762-A23C9D2F4928}" dt="2023-11-06T21:57:08.574" v="154" actId="21"/>
-          <ac:spMkLst>
-            <pc:docMk/>
-            <pc:sldMk cId="1967199282" sldId="256"/>
-            <ac:spMk id="253" creationId="{0BE0D2A8-C151-4A2C-B3EF-8C81AFF0BA36}"/>
-          </ac:spMkLst>
-        </pc:spChg>
-        <pc:spChg chg="del mod">
-          <ac:chgData name="Fatima Pillosu" userId="a6295d4dc9e22643" providerId="LiveId" clId="{E4EB9531-B35B-4F76-8762-A23C9D2F4928}" dt="2023-11-06T21:57:08.574" v="154" actId="21"/>
-          <ac:spMkLst>
-            <pc:docMk/>
-            <pc:sldMk cId="1967199282" sldId="256"/>
-            <ac:spMk id="254" creationId="{0E48E4EC-C16D-86BA-6B5F-5BE870A5F89F}"/>
-          </ac:spMkLst>
-        </pc:spChg>
-        <pc:spChg chg="del mod">
-          <ac:chgData name="Fatima Pillosu" userId="a6295d4dc9e22643" providerId="LiveId" clId="{E4EB9531-B35B-4F76-8762-A23C9D2F4928}" dt="2023-11-06T21:57:08.574" v="154" actId="21"/>
-          <ac:spMkLst>
-            <pc:docMk/>
-            <pc:sldMk cId="1967199282" sldId="256"/>
-            <ac:spMk id="255" creationId="{EB567113-64AD-A75E-82C3-AC8DCF388F3D}"/>
-          </ac:spMkLst>
-        </pc:spChg>
-        <pc:spChg chg="del mod">
-          <ac:chgData name="Fatima Pillosu" userId="a6295d4dc9e22643" providerId="LiveId" clId="{E4EB9531-B35B-4F76-8762-A23C9D2F4928}" dt="2023-11-06T21:57:08.574" v="154" actId="21"/>
-          <ac:spMkLst>
-            <pc:docMk/>
-            <pc:sldMk cId="1967199282" sldId="256"/>
-            <ac:spMk id="256" creationId="{B62BEE55-838F-0DEE-4C9C-9A043DAF50DB}"/>
-          </ac:spMkLst>
-        </pc:spChg>
-        <pc:spChg chg="del mod">
-          <ac:chgData name="Fatima Pillosu" userId="a6295d4dc9e22643" providerId="LiveId" clId="{E4EB9531-B35B-4F76-8762-A23C9D2F4928}" dt="2023-11-06T21:57:08.574" v="154" actId="21"/>
-          <ac:spMkLst>
-            <pc:docMk/>
-            <pc:sldMk cId="1967199282" sldId="256"/>
-            <ac:spMk id="257" creationId="{D5201F61-8DC6-DC55-555C-2AA6472F2DF3}"/>
-          </ac:spMkLst>
-        </pc:spChg>
-        <pc:spChg chg="add mod">
-          <ac:chgData name="Fatima Pillosu" userId="a6295d4dc9e22643" providerId="LiveId" clId="{E4EB9531-B35B-4F76-8762-A23C9D2F4928}" dt="2023-11-06T21:57:52.980" v="155"/>
-          <ac:spMkLst>
-            <pc:docMk/>
-            <pc:sldMk cId="1967199282" sldId="256"/>
-            <ac:spMk id="260" creationId="{1E5BA1C2-2028-5318-7810-4B48EA78FEEA}"/>
-          </ac:spMkLst>
-        </pc:spChg>
-        <pc:spChg chg="add mod">
-          <ac:chgData name="Fatima Pillosu" userId="a6295d4dc9e22643" providerId="LiveId" clId="{E4EB9531-B35B-4F76-8762-A23C9D2F4928}" dt="2023-11-06T21:57:52.980" v="155"/>
-          <ac:spMkLst>
-            <pc:docMk/>
-            <pc:sldMk cId="1967199282" sldId="256"/>
-            <ac:spMk id="261" creationId="{2451CFC0-DC5E-FEDA-C5D0-8DD328643A73}"/>
-          </ac:spMkLst>
-        </pc:spChg>
-        <pc:spChg chg="add mod">
-          <ac:chgData name="Fatima Pillosu" userId="a6295d4dc9e22643" providerId="LiveId" clId="{E4EB9531-B35B-4F76-8762-A23C9D2F4928}" dt="2023-11-06T21:57:52.980" v="155"/>
-          <ac:spMkLst>
-            <pc:docMk/>
-            <pc:sldMk cId="1967199282" sldId="256"/>
-            <ac:spMk id="262" creationId="{21FE2E6D-5E01-4F48-E3E9-740DAA4C7A43}"/>
-          </ac:spMkLst>
-        </pc:spChg>
-        <pc:spChg chg="add mod">
-          <ac:chgData name="Fatima Pillosu" userId="a6295d4dc9e22643" providerId="LiveId" clId="{E4EB9531-B35B-4F76-8762-A23C9D2F4928}" dt="2023-11-06T21:57:52.980" v="155"/>
-          <ac:spMkLst>
-            <pc:docMk/>
-            <pc:sldMk cId="1967199282" sldId="256"/>
-            <ac:spMk id="264" creationId="{78F31C95-F3D0-6ADA-D4CF-AC0BA5D58FC8}"/>
-          </ac:spMkLst>
-        </pc:spChg>
-        <pc:spChg chg="del mod">
-          <ac:chgData name="Fatima Pillosu" userId="a6295d4dc9e22643" providerId="LiveId" clId="{E4EB9531-B35B-4F76-8762-A23C9D2F4928}" dt="2023-11-06T21:57:08.574" v="154" actId="21"/>
-          <ac:spMkLst>
-            <pc:docMk/>
-            <pc:sldMk cId="1967199282" sldId="256"/>
-            <ac:spMk id="267" creationId="{A528C180-F9E4-ADA5-CB22-0F1DDAC74562}"/>
-          </ac:spMkLst>
-        </pc:spChg>
-        <pc:spChg chg="del mod">
-          <ac:chgData name="Fatima Pillosu" userId="a6295d4dc9e22643" providerId="LiveId" clId="{E4EB9531-B35B-4F76-8762-A23C9D2F4928}" dt="2023-11-06T21:57:08.574" v="154" actId="21"/>
-          <ac:spMkLst>
-            <pc:docMk/>
-            <pc:sldMk cId="1967199282" sldId="256"/>
-            <ac:spMk id="268" creationId="{DA892BFD-0AF2-8478-BD33-1ED7E8FD0460}"/>
-          </ac:spMkLst>
-        </pc:spChg>
-        <pc:spChg chg="del mod">
-          <ac:chgData name="Fatima Pillosu" userId="a6295d4dc9e22643" providerId="LiveId" clId="{E4EB9531-B35B-4F76-8762-A23C9D2F4928}" dt="2023-11-06T21:57:08.574" v="154" actId="21"/>
-          <ac:spMkLst>
-            <pc:docMk/>
-            <pc:sldMk cId="1967199282" sldId="256"/>
-            <ac:spMk id="269" creationId="{BFAEBAF0-FCD8-5141-B043-736D20F16E41}"/>
-          </ac:spMkLst>
-        </pc:spChg>
-        <pc:spChg chg="del mod">
-          <ac:chgData name="Fatima Pillosu" userId="a6295d4dc9e22643" providerId="LiveId" clId="{E4EB9531-B35B-4F76-8762-A23C9D2F4928}" dt="2023-11-06T21:57:08.574" v="154" actId="21"/>
-          <ac:spMkLst>
-            <pc:docMk/>
-            <pc:sldMk cId="1967199282" sldId="256"/>
-            <ac:spMk id="270" creationId="{A8786CD5-04A2-817C-19B6-DEBC50A16D07}"/>
-          </ac:spMkLst>
-        </pc:spChg>
-        <pc:spChg chg="del mod">
-          <ac:chgData name="Fatima Pillosu" userId="a6295d4dc9e22643" providerId="LiveId" clId="{E4EB9531-B35B-4F76-8762-A23C9D2F4928}" dt="2023-11-06T21:57:08.574" v="154" actId="21"/>
-          <ac:spMkLst>
-            <pc:docMk/>
-            <pc:sldMk cId="1967199282" sldId="256"/>
-            <ac:spMk id="271" creationId="{5AC9C89B-BA5A-E6D0-9B29-C896DCBCED67}"/>
-          </ac:spMkLst>
-        </pc:spChg>
-        <pc:spChg chg="del mod">
-          <ac:chgData name="Fatima Pillosu" userId="a6295d4dc9e22643" providerId="LiveId" clId="{E4EB9531-B35B-4F76-8762-A23C9D2F4928}" dt="2023-11-06T21:57:08.574" v="154" actId="21"/>
-          <ac:spMkLst>
-            <pc:docMk/>
-            <pc:sldMk cId="1967199282" sldId="256"/>
-            <ac:spMk id="272" creationId="{E351EFDD-3FE1-F190-8AB6-624E250C6ED1}"/>
-          </ac:spMkLst>
-        </pc:spChg>
-        <pc:spChg chg="del mod">
-          <ac:chgData name="Fatima Pillosu" userId="a6295d4dc9e22643" providerId="LiveId" clId="{E4EB9531-B35B-4F76-8762-A23C9D2F4928}" dt="2023-11-06T21:57:08.574" v="154" actId="21"/>
-          <ac:spMkLst>
-            <pc:docMk/>
-            <pc:sldMk cId="1967199282" sldId="256"/>
-            <ac:spMk id="273" creationId="{D654CA22-146C-71EB-0731-8DC06B7AEE31}"/>
-          </ac:spMkLst>
-        </pc:spChg>
-        <pc:spChg chg="del mod">
-          <ac:chgData name="Fatima Pillosu" userId="a6295d4dc9e22643" providerId="LiveId" clId="{E4EB9531-B35B-4F76-8762-A23C9D2F4928}" dt="2023-11-06T21:57:08.574" v="154" actId="21"/>
-          <ac:spMkLst>
-            <pc:docMk/>
-            <pc:sldMk cId="1967199282" sldId="256"/>
-            <ac:spMk id="274" creationId="{7EE71E49-043F-82D8-2A0C-B76C1DA664F1}"/>
-          </ac:spMkLst>
-        </pc:spChg>
-        <pc:spChg chg="del mod">
-          <ac:chgData name="Fatima Pillosu" userId="a6295d4dc9e22643" providerId="LiveId" clId="{E4EB9531-B35B-4F76-8762-A23C9D2F4928}" dt="2023-11-06T21:57:08.574" v="154" actId="21"/>
-          <ac:spMkLst>
-            <pc:docMk/>
-            <pc:sldMk cId="1967199282" sldId="256"/>
-            <ac:spMk id="275" creationId="{48767C8C-3E90-3188-FD4F-E142AB62976E}"/>
-          </ac:spMkLst>
-        </pc:spChg>
-        <pc:spChg chg="add mod">
-          <ac:chgData name="Fatima Pillosu" userId="a6295d4dc9e22643" providerId="LiveId" clId="{E4EB9531-B35B-4F76-8762-A23C9D2F4928}" dt="2023-11-06T22:19:36.932" v="234" actId="20577"/>
-          <ac:spMkLst>
-            <pc:docMk/>
-            <pc:sldMk cId="1967199282" sldId="256"/>
-            <ac:spMk id="276" creationId="{9C07D085-9018-45D7-4E21-4213FB6AD6E4}"/>
-          </ac:spMkLst>
-        </pc:spChg>
-        <pc:spChg chg="add mod">
-          <ac:chgData name="Fatima Pillosu" userId="a6295d4dc9e22643" providerId="LiveId" clId="{E4EB9531-B35B-4F76-8762-A23C9D2F4928}" dt="2023-11-06T21:57:52.980" v="155"/>
-          <ac:spMkLst>
-            <pc:docMk/>
-            <pc:sldMk cId="1967199282" sldId="256"/>
-            <ac:spMk id="278" creationId="{134F1432-58E2-3A01-EC87-C158ECC7EA92}"/>
-          </ac:spMkLst>
-        </pc:spChg>
-        <pc:spChg chg="add mod">
-          <ac:chgData name="Fatima Pillosu" userId="a6295d4dc9e22643" providerId="LiveId" clId="{E4EB9531-B35B-4F76-8762-A23C9D2F4928}" dt="2023-11-06T22:20:43.534" v="273" actId="1036"/>
+          <ac:chgData name="Fatima Pillosu" userId="a6295d4dc9e22643" providerId="LiveId" clId="{E4EB9531-B35B-4F76-8762-A23C9D2F4928}" dt="2023-11-08T22:32:18.293" v="339" actId="20577"/>
           <ac:spMkLst>
             <pc:docMk/>
             <pc:sldMk cId="1967199282" sldId="256"/>
@@ -1808,6 +1808,14 @@
           </ac:grpSpMkLst>
         </pc:grpChg>
         <pc:picChg chg="add mod">
+          <ac:chgData name="Fatima Pillosu" userId="a6295d4dc9e22643" providerId="LiveId" clId="{E4EB9531-B35B-4F76-8762-A23C9D2F4928}" dt="2023-11-08T22:37:27.979" v="477" actId="12789"/>
+          <ac:picMkLst>
+            <pc:docMk/>
+            <pc:sldMk cId="1967199282" sldId="256"/>
+            <ac:picMk id="2" creationId="{EDC92F73-5EDE-AEE4-BC75-0B0EE9B0CB52}"/>
+          </ac:picMkLst>
+        </pc:picChg>
+        <pc:picChg chg="add mod">
           <ac:chgData name="Fatima Pillosu" userId="a6295d4dc9e22643" providerId="LiveId" clId="{E4EB9531-B35B-4F76-8762-A23C9D2F4928}" dt="2023-11-06T21:57:52.980" v="155"/>
           <ac:picMkLst>
             <pc:docMk/>
@@ -1832,11 +1840,27 @@
           </ac:picMkLst>
         </pc:picChg>
         <pc:picChg chg="add mod">
-          <ac:chgData name="Fatima Pillosu" userId="a6295d4dc9e22643" providerId="LiveId" clId="{E4EB9531-B35B-4F76-8762-A23C9D2F4928}" dt="2023-11-06T21:57:52.980" v="155"/>
+          <ac:chgData name="Fatima Pillosu" userId="a6295d4dc9e22643" providerId="LiveId" clId="{E4EB9531-B35B-4F76-8762-A23C9D2F4928}" dt="2023-11-08T22:37:34.392" v="478" actId="12789"/>
           <ac:picMkLst>
             <pc:docMk/>
             <pc:sldMk cId="1967199282" sldId="256"/>
+            <ac:picMk id="5" creationId="{F4BBE349-03C5-ABDC-674E-DBEE4E686C32}"/>
+          </ac:picMkLst>
+        </pc:picChg>
+        <pc:picChg chg="add del mod">
+          <ac:chgData name="Fatima Pillosu" userId="a6295d4dc9e22643" providerId="LiveId" clId="{E4EB9531-B35B-4F76-8762-A23C9D2F4928}" dt="2023-11-08T22:36:31.984" v="472" actId="478"/>
+          <ac:picMkLst>
+            <pc:docMk/>
+            <pc:sldMk cId="1967199282" sldId="256"/>
             <ac:picMk id="6" creationId="{BF1C67DD-E253-D4B6-4E28-390727A5F0B0}"/>
+          </ac:picMkLst>
+        </pc:picChg>
+        <pc:picChg chg="add mod">
+          <ac:chgData name="Fatima Pillosu" userId="a6295d4dc9e22643" providerId="LiveId" clId="{E4EB9531-B35B-4F76-8762-A23C9D2F4928}" dt="2023-11-08T22:37:27.979" v="477" actId="12789"/>
+          <ac:picMkLst>
+            <pc:docMk/>
+            <pc:sldMk cId="1967199282" sldId="256"/>
+            <ac:picMk id="7" creationId="{32449396-FC05-D33F-7D1F-EE4676157768}"/>
           </ac:picMkLst>
         </pc:picChg>
         <pc:picChg chg="del mod">
@@ -1855,6 +1879,14 @@
             <ac:picMk id="8" creationId="{14F90887-92B1-B98F-4D64-0130213747FA}"/>
           </ac:picMkLst>
         </pc:picChg>
+        <pc:picChg chg="add mod">
+          <ac:chgData name="Fatima Pillosu" userId="a6295d4dc9e22643" providerId="LiveId" clId="{E4EB9531-B35B-4F76-8762-A23C9D2F4928}" dt="2023-11-08T22:37:34.392" v="478" actId="12789"/>
+          <ac:picMkLst>
+            <pc:docMk/>
+            <pc:sldMk cId="1967199282" sldId="256"/>
+            <ac:picMk id="8" creationId="{33243045-1C82-47E1-8D1F-A571BAAB13A7}"/>
+          </ac:picMkLst>
+        </pc:picChg>
         <pc:picChg chg="del mod">
           <ac:chgData name="Fatima Pillosu" userId="a6295d4dc9e22643" providerId="LiveId" clId="{E4EB9531-B35B-4F76-8762-A23C9D2F4928}" dt="2023-11-06T21:57:08.574" v="154" actId="21"/>
           <ac:picMkLst>
@@ -1879,24 +1911,24 @@
             <ac:picMk id="11" creationId="{1D03567F-3B79-9E74-21E1-8169A8EE17D1}"/>
           </ac:picMkLst>
         </pc:picChg>
-        <pc:picChg chg="add mod">
-          <ac:chgData name="Fatima Pillosu" userId="a6295d4dc9e22643" providerId="LiveId" clId="{E4EB9531-B35B-4F76-8762-A23C9D2F4928}" dt="2023-11-06T21:57:52.980" v="155"/>
+        <pc:picChg chg="add del mod">
+          <ac:chgData name="Fatima Pillosu" userId="a6295d4dc9e22643" providerId="LiveId" clId="{E4EB9531-B35B-4F76-8762-A23C9D2F4928}" dt="2023-11-08T22:36:31.984" v="472" actId="478"/>
           <ac:picMkLst>
             <pc:docMk/>
             <pc:sldMk cId="1967199282" sldId="256"/>
             <ac:picMk id="12" creationId="{DE7B9C16-A990-D9C3-F1B4-1D0E9D40B09B}"/>
           </ac:picMkLst>
         </pc:picChg>
-        <pc:picChg chg="add mod">
-          <ac:chgData name="Fatima Pillosu" userId="a6295d4dc9e22643" providerId="LiveId" clId="{E4EB9531-B35B-4F76-8762-A23C9D2F4928}" dt="2023-11-06T21:57:52.980" v="155"/>
+        <pc:picChg chg="add del mod">
+          <ac:chgData name="Fatima Pillosu" userId="a6295d4dc9e22643" providerId="LiveId" clId="{E4EB9531-B35B-4F76-8762-A23C9D2F4928}" dt="2023-11-08T22:36:31.984" v="472" actId="478"/>
           <ac:picMkLst>
             <pc:docMk/>
             <pc:sldMk cId="1967199282" sldId="256"/>
             <ac:picMk id="34" creationId="{74F9DAF7-BF60-D8FC-9548-B6928E06E782}"/>
           </ac:picMkLst>
         </pc:picChg>
-        <pc:picChg chg="add mod">
-          <ac:chgData name="Fatima Pillosu" userId="a6295d4dc9e22643" providerId="LiveId" clId="{E4EB9531-B35B-4F76-8762-A23C9D2F4928}" dt="2023-11-06T21:57:52.980" v="155"/>
+        <pc:picChg chg="add del mod">
+          <ac:chgData name="Fatima Pillosu" userId="a6295d4dc9e22643" providerId="LiveId" clId="{E4EB9531-B35B-4F76-8762-A23C9D2F4928}" dt="2023-11-08T22:36:31.984" v="472" actId="478"/>
           <ac:picMkLst>
             <pc:docMk/>
             <pc:sldMk cId="1967199282" sldId="256"/>
@@ -2527,6 +2559,61 @@
             <ac:cxnSpMk id="329" creationId="{9024DCD9-76A5-1567-680D-BD80318DD9D9}"/>
           </ac:cxnSpMkLst>
         </pc:cxnChg>
+      </pc:sldChg>
+      <pc:sldChg chg="addSp delSp modSp new del mod">
+        <pc:chgData name="Fatima Pillosu" userId="a6295d4dc9e22643" providerId="LiveId" clId="{E4EB9531-B35B-4F76-8762-A23C9D2F4928}" dt="2023-11-08T22:39:33.949" v="516" actId="47"/>
+        <pc:sldMkLst>
+          <pc:docMk/>
+          <pc:sldMk cId="3728957230" sldId="257"/>
+        </pc:sldMkLst>
+        <pc:spChg chg="del">
+          <ac:chgData name="Fatima Pillosu" userId="a6295d4dc9e22643" providerId="LiveId" clId="{E4EB9531-B35B-4F76-8762-A23C9D2F4928}" dt="2023-11-08T22:32:34.512" v="342" actId="478"/>
+          <ac:spMkLst>
+            <pc:docMk/>
+            <pc:sldMk cId="3728957230" sldId="257"/>
+            <ac:spMk id="2" creationId="{6EA90036-94C4-A27A-A2AE-ABBEB324566D}"/>
+          </ac:spMkLst>
+        </pc:spChg>
+        <pc:spChg chg="del">
+          <ac:chgData name="Fatima Pillosu" userId="a6295d4dc9e22643" providerId="LiveId" clId="{E4EB9531-B35B-4F76-8762-A23C9D2F4928}" dt="2023-11-08T22:32:33.666" v="341" actId="478"/>
+          <ac:spMkLst>
+            <pc:docMk/>
+            <pc:sldMk cId="3728957230" sldId="257"/>
+            <ac:spMk id="3" creationId="{9C01E079-6DA8-918B-EC92-6A2C233FD4B4}"/>
+          </ac:spMkLst>
+        </pc:spChg>
+        <pc:picChg chg="add del mod modCrop">
+          <ac:chgData name="Fatima Pillosu" userId="a6295d4dc9e22643" providerId="LiveId" clId="{E4EB9531-B35B-4F76-8762-A23C9D2F4928}" dt="2023-11-08T22:36:19.888" v="469" actId="21"/>
+          <ac:picMkLst>
+            <pc:docMk/>
+            <pc:sldMk cId="3728957230" sldId="257"/>
+            <ac:picMk id="5" creationId="{2BFE55C8-D67D-09F3-B67B-233B738106F0}"/>
+          </ac:picMkLst>
+        </pc:picChg>
+        <pc:picChg chg="add del mod modCrop">
+          <ac:chgData name="Fatima Pillosu" userId="a6295d4dc9e22643" providerId="LiveId" clId="{E4EB9531-B35B-4F76-8762-A23C9D2F4928}" dt="2023-11-08T22:36:19.888" v="469" actId="21"/>
+          <ac:picMkLst>
+            <pc:docMk/>
+            <pc:sldMk cId="3728957230" sldId="257"/>
+            <ac:picMk id="7" creationId="{B6D9A484-A5BD-2796-D426-5C0A0B0139C7}"/>
+          </ac:picMkLst>
+        </pc:picChg>
+        <pc:picChg chg="add del mod modCrop">
+          <ac:chgData name="Fatima Pillosu" userId="a6295d4dc9e22643" providerId="LiveId" clId="{E4EB9531-B35B-4F76-8762-A23C9D2F4928}" dt="2023-11-08T22:36:19.888" v="469" actId="21"/>
+          <ac:picMkLst>
+            <pc:docMk/>
+            <pc:sldMk cId="3728957230" sldId="257"/>
+            <ac:picMk id="9" creationId="{5B34E00C-6ADF-3450-0A3A-7E56188A5835}"/>
+          </ac:picMkLst>
+        </pc:picChg>
+        <pc:picChg chg="add del mod modCrop">
+          <ac:chgData name="Fatima Pillosu" userId="a6295d4dc9e22643" providerId="LiveId" clId="{E4EB9531-B35B-4F76-8762-A23C9D2F4928}" dt="2023-11-08T22:36:19.888" v="469" actId="21"/>
+          <ac:picMkLst>
+            <pc:docMk/>
+            <pc:sldMk cId="3728957230" sldId="257"/>
+            <ac:picMk id="11" creationId="{B3A75781-8123-2362-881B-D90F4CF49D63}"/>
+          </ac:picMkLst>
+        </pc:picChg>
       </pc:sldChg>
     </pc:docChg>
   </pc:docChgLst>
@@ -2664,7 +2751,7 @@
           <a:p>
             <a:fld id="{BE66BE40-8B0C-4A52-BD4D-0C8256116241}" type="datetimeFigureOut">
               <a:rPr lang="en-GB" smtClean="0"/>
-              <a:t>06/11/2023</a:t>
+              <a:t>08/11/2023</a:t>
             </a:fld>
             <a:endParaRPr lang="en-GB"/>
           </a:p>
@@ -2834,7 +2921,7 @@
           <a:p>
             <a:fld id="{BE66BE40-8B0C-4A52-BD4D-0C8256116241}" type="datetimeFigureOut">
               <a:rPr lang="en-GB" smtClean="0"/>
-              <a:t>06/11/2023</a:t>
+              <a:t>08/11/2023</a:t>
             </a:fld>
             <a:endParaRPr lang="en-GB"/>
           </a:p>
@@ -3014,7 +3101,7 @@
           <a:p>
             <a:fld id="{BE66BE40-8B0C-4A52-BD4D-0C8256116241}" type="datetimeFigureOut">
               <a:rPr lang="en-GB" smtClean="0"/>
-              <a:t>06/11/2023</a:t>
+              <a:t>08/11/2023</a:t>
             </a:fld>
             <a:endParaRPr lang="en-GB"/>
           </a:p>
@@ -3184,7 +3271,7 @@
           <a:p>
             <a:fld id="{BE66BE40-8B0C-4A52-BD4D-0C8256116241}" type="datetimeFigureOut">
               <a:rPr lang="en-GB" smtClean="0"/>
-              <a:t>06/11/2023</a:t>
+              <a:t>08/11/2023</a:t>
             </a:fld>
             <a:endParaRPr lang="en-GB"/>
           </a:p>
@@ -3428,7 +3515,7 @@
           <a:p>
             <a:fld id="{BE66BE40-8B0C-4A52-BD4D-0C8256116241}" type="datetimeFigureOut">
               <a:rPr lang="en-GB" smtClean="0"/>
-              <a:t>06/11/2023</a:t>
+              <a:t>08/11/2023</a:t>
             </a:fld>
             <a:endParaRPr lang="en-GB"/>
           </a:p>
@@ -3660,7 +3747,7 @@
           <a:p>
             <a:fld id="{BE66BE40-8B0C-4A52-BD4D-0C8256116241}" type="datetimeFigureOut">
               <a:rPr lang="en-GB" smtClean="0"/>
-              <a:t>06/11/2023</a:t>
+              <a:t>08/11/2023</a:t>
             </a:fld>
             <a:endParaRPr lang="en-GB"/>
           </a:p>
@@ -4027,7 +4114,7 @@
           <a:p>
             <a:fld id="{BE66BE40-8B0C-4A52-BD4D-0C8256116241}" type="datetimeFigureOut">
               <a:rPr lang="en-GB" smtClean="0"/>
-              <a:t>06/11/2023</a:t>
+              <a:t>08/11/2023</a:t>
             </a:fld>
             <a:endParaRPr lang="en-GB"/>
           </a:p>
@@ -4145,7 +4232,7 @@
           <a:p>
             <a:fld id="{BE66BE40-8B0C-4A52-BD4D-0C8256116241}" type="datetimeFigureOut">
               <a:rPr lang="en-GB" smtClean="0"/>
-              <a:t>06/11/2023</a:t>
+              <a:t>08/11/2023</a:t>
             </a:fld>
             <a:endParaRPr lang="en-GB"/>
           </a:p>
@@ -4240,7 +4327,7 @@
           <a:p>
             <a:fld id="{BE66BE40-8B0C-4A52-BD4D-0C8256116241}" type="datetimeFigureOut">
               <a:rPr lang="en-GB" smtClean="0"/>
-              <a:t>06/11/2023</a:t>
+              <a:t>08/11/2023</a:t>
             </a:fld>
             <a:endParaRPr lang="en-GB"/>
           </a:p>
@@ -4517,7 +4604,7 @@
           <a:p>
             <a:fld id="{BE66BE40-8B0C-4A52-BD4D-0C8256116241}" type="datetimeFigureOut">
               <a:rPr lang="en-GB" smtClean="0"/>
-              <a:t>06/11/2023</a:t>
+              <a:t>08/11/2023</a:t>
             </a:fld>
             <a:endParaRPr lang="en-GB"/>
           </a:p>
@@ -4774,7 +4861,7 @@
           <a:p>
             <a:fld id="{BE66BE40-8B0C-4A52-BD4D-0C8256116241}" type="datetimeFigureOut">
               <a:rPr lang="en-GB" smtClean="0"/>
-              <a:t>06/11/2023</a:t>
+              <a:t>08/11/2023</a:t>
             </a:fld>
             <a:endParaRPr lang="en-GB"/>
           </a:p>
@@ -4987,7 +5074,7 @@
           <a:p>
             <a:fld id="{BE66BE40-8B0C-4A52-BD4D-0C8256116241}" type="datetimeFigureOut">
               <a:rPr lang="en-GB" smtClean="0"/>
-              <a:t>06/11/2023</a:t>
+              <a:t>08/11/2023</a:t>
             </a:fld>
             <a:endParaRPr lang="en-GB"/>
           </a:p>
@@ -5462,146 +5549,6 @@
           </a:prstGeom>
         </p:spPr>
       </p:pic>
-      <p:pic>
-        <p:nvPicPr>
-          <p:cNvPr id="6" name="Picture 7" descr="A map of the weather&#10;&#10;Description automatically generated">
-            <a:extLst>
-              <a:ext uri="{FF2B5EF4-FFF2-40B4-BE49-F238E27FC236}">
-                <a16:creationId xmlns:a16="http://schemas.microsoft.com/office/drawing/2014/main" id="{BF1C67DD-E253-D4B6-4E28-390727A5F0B0}"/>
-              </a:ext>
-            </a:extLst>
-          </p:cNvPr>
-          <p:cNvPicPr>
-            <a:picLocks noChangeAspect="1"/>
-          </p:cNvPicPr>
-          <p:nvPr/>
-        </p:nvPicPr>
-        <p:blipFill rotWithShape="1">
-          <a:blip r:embed="rId4">
-            <a:extLst>
-              <a:ext uri="{28A0092B-C50C-407E-A947-70E740481C1C}">
-                <a14:useLocalDpi xmlns:a14="http://schemas.microsoft.com/office/drawing/2010/main" val="0"/>
-              </a:ext>
-            </a:extLst>
-          </a:blip>
-          <a:srcRect l="7412" t="16886" r="39717" b="4618"/>
-          <a:stretch/>
-        </p:blipFill>
-        <p:spPr>
-          <a:xfrm>
-            <a:off x="5096596" y="1808529"/>
-            <a:ext cx="1353680" cy="1421947"/>
-          </a:xfrm>
-          <a:prstGeom prst="rect">
-            <a:avLst/>
-          </a:prstGeom>
-        </p:spPr>
-      </p:pic>
-      <p:pic>
-        <p:nvPicPr>
-          <p:cNvPr id="12" name="Picture 8" descr="A map of the weather&#10;&#10;Description automatically generated">
-            <a:extLst>
-              <a:ext uri="{FF2B5EF4-FFF2-40B4-BE49-F238E27FC236}">
-                <a16:creationId xmlns:a16="http://schemas.microsoft.com/office/drawing/2014/main" id="{DE7B9C16-A990-D9C3-F1B4-1D0E9D40B09B}"/>
-              </a:ext>
-            </a:extLst>
-          </p:cNvPr>
-          <p:cNvPicPr>
-            <a:picLocks noChangeAspect="1"/>
-          </p:cNvPicPr>
-          <p:nvPr/>
-        </p:nvPicPr>
-        <p:blipFill rotWithShape="1">
-          <a:blip r:embed="rId5">
-            <a:extLst>
-              <a:ext uri="{28A0092B-C50C-407E-A947-70E740481C1C}">
-                <a14:useLocalDpi xmlns:a14="http://schemas.microsoft.com/office/drawing/2010/main" val="0"/>
-              </a:ext>
-            </a:extLst>
-          </a:blip>
-          <a:srcRect l="7412" t="19688" r="39717" b="1816"/>
-          <a:stretch/>
-        </p:blipFill>
-        <p:spPr>
-          <a:xfrm>
-            <a:off x="5096595" y="3242286"/>
-            <a:ext cx="1353680" cy="1421948"/>
-          </a:xfrm>
-          <a:prstGeom prst="rect">
-            <a:avLst/>
-          </a:prstGeom>
-        </p:spPr>
-      </p:pic>
-      <p:pic>
-        <p:nvPicPr>
-          <p:cNvPr id="34" name="Picture 9" descr="A map of the weather&#10;&#10;Description automatically generated with medium confidence">
-            <a:extLst>
-              <a:ext uri="{FF2B5EF4-FFF2-40B4-BE49-F238E27FC236}">
-                <a16:creationId xmlns:a16="http://schemas.microsoft.com/office/drawing/2014/main" id="{74F9DAF7-BF60-D8FC-9548-B6928E06E782}"/>
-              </a:ext>
-            </a:extLst>
-          </p:cNvPr>
-          <p:cNvPicPr>
-            <a:picLocks noChangeAspect="1"/>
-          </p:cNvPicPr>
-          <p:nvPr/>
-        </p:nvPicPr>
-        <p:blipFill rotWithShape="1">
-          <a:blip r:embed="rId6">
-            <a:extLst>
-              <a:ext uri="{28A0092B-C50C-407E-A947-70E740481C1C}">
-                <a14:useLocalDpi xmlns:a14="http://schemas.microsoft.com/office/drawing/2010/main" val="0"/>
-              </a:ext>
-            </a:extLst>
-          </a:blip>
-          <a:srcRect l="4041" t="16886" r="42702" b="4618"/>
-          <a:stretch/>
-        </p:blipFill>
-        <p:spPr>
-          <a:xfrm>
-            <a:off x="3726410" y="1808529"/>
-            <a:ext cx="1363558" cy="1421947"/>
-          </a:xfrm>
-          <a:prstGeom prst="rect">
-            <a:avLst/>
-          </a:prstGeom>
-        </p:spPr>
-      </p:pic>
-      <p:pic>
-        <p:nvPicPr>
-          <p:cNvPr id="35" name="Picture 10" descr="A map of a weather forecast&#10;&#10;Description automatically generated">
-            <a:extLst>
-              <a:ext uri="{FF2B5EF4-FFF2-40B4-BE49-F238E27FC236}">
-                <a16:creationId xmlns:a16="http://schemas.microsoft.com/office/drawing/2014/main" id="{70AA2EBD-7C91-2DF7-3629-C8114A7C2ACE}"/>
-              </a:ext>
-            </a:extLst>
-          </p:cNvPr>
-          <p:cNvPicPr>
-            <a:picLocks noChangeAspect="1"/>
-          </p:cNvPicPr>
-          <p:nvPr/>
-        </p:nvPicPr>
-        <p:blipFill rotWithShape="1">
-          <a:blip r:embed="rId7">
-            <a:extLst>
-              <a:ext uri="{28A0092B-C50C-407E-A947-70E740481C1C}">
-                <a14:useLocalDpi xmlns:a14="http://schemas.microsoft.com/office/drawing/2010/main" val="0"/>
-              </a:ext>
-            </a:extLst>
-          </a:blip>
-          <a:srcRect l="4043" t="19688" r="42702" b="1816"/>
-          <a:stretch/>
-        </p:blipFill>
-        <p:spPr>
-          <a:xfrm>
-            <a:off x="3726410" y="3242286"/>
-            <a:ext cx="1363558" cy="1421947"/>
-          </a:xfrm>
-          <a:prstGeom prst="rect">
-            <a:avLst/>
-          </a:prstGeom>
-        </p:spPr>
-      </p:pic>
       <p:grpSp>
         <p:nvGrpSpPr>
           <p:cNvPr id="36" name="Group 126">
@@ -5637,13 +5584,13 @@
             <p:nvPr/>
           </p:nvPicPr>
           <p:blipFill rotWithShape="1">
-            <a:blip r:embed="rId8">
+            <a:blip r:embed="rId4">
               <a:extLst>
                 <a:ext uri="{28A0092B-C50C-407E-A947-70E740481C1C}">
                   <a14:useLocalDpi xmlns:a14="http://schemas.microsoft.com/office/drawing/2010/main" val="0"/>
                 </a:ext>
                 <a:ext uri="{96DAC541-7B7A-43D3-8B79-37D633B846F1}">
-                  <asvg:svgBlip xmlns:asvg="http://schemas.microsoft.com/office/drawing/2016/SVG/main" r:embed="rId9"/>
+                  <asvg:svgBlip xmlns:asvg="http://schemas.microsoft.com/office/drawing/2016/SVG/main" r:embed="rId5"/>
                 </a:ext>
               </a:extLst>
             </a:blip>
@@ -9716,528 +9663,6 @@
       </p:sp>
       <p:sp>
         <p:nvSpPr>
-          <p:cNvPr id="149" name="TextBox 115">
-            <a:extLst>
-              <a:ext uri="{FF2B5EF4-FFF2-40B4-BE49-F238E27FC236}">
-                <a16:creationId xmlns:a16="http://schemas.microsoft.com/office/drawing/2014/main" id="{B2D9AE0E-D7BB-624F-E92F-9B8205F1044A}"/>
-              </a:ext>
-            </a:extLst>
-          </p:cNvPr>
-          <p:cNvSpPr txBox="1"/>
-          <p:nvPr/>
-        </p:nvSpPr>
-        <p:spPr>
-          <a:xfrm rot="16200000">
-            <a:off x="3120763" y="2436366"/>
-            <a:ext cx="903388" cy="215444"/>
-          </a:xfrm>
-          <a:prstGeom prst="rect">
-            <a:avLst/>
-          </a:prstGeom>
-          <a:noFill/>
-          <a:ln w="3175">
-            <a:solidFill>
-              <a:schemeClr val="tx1">
-                <a:lumMod val="75000"/>
-                <a:lumOff val="25000"/>
-              </a:schemeClr>
-            </a:solidFill>
-          </a:ln>
-        </p:spPr>
-        <p:txBody>
-          <a:bodyPr wrap="square" rtlCol="0">
-            <a:spAutoFit/>
-          </a:bodyPr>
-          <a:lstStyle/>
-          <a:p>
-            <a:pPr algn="ctr"/>
-            <a:r>
-              <a:rPr lang="en-GB" sz="800" dirty="0">
-                <a:solidFill>
-                  <a:schemeClr val="tx1">
-                    <a:lumMod val="75000"/>
-                    <a:lumOff val="25000"/>
-                  </a:schemeClr>
-                </a:solidFill>
-              </a:rPr>
-              <a:t>T+60, Nighttime</a:t>
-            </a:r>
-          </a:p>
-        </p:txBody>
-      </p:sp>
-      <p:sp>
-        <p:nvSpPr>
-          <p:cNvPr id="171" name="TextBox 116">
-            <a:extLst>
-              <a:ext uri="{FF2B5EF4-FFF2-40B4-BE49-F238E27FC236}">
-                <a16:creationId xmlns:a16="http://schemas.microsoft.com/office/drawing/2014/main" id="{D25BDD5B-14E5-0149-483D-A4306A0EC11C}"/>
-              </a:ext>
-            </a:extLst>
-          </p:cNvPr>
-          <p:cNvSpPr txBox="1"/>
-          <p:nvPr/>
-        </p:nvSpPr>
-        <p:spPr>
-          <a:xfrm rot="16200000">
-            <a:off x="3120762" y="3818600"/>
-            <a:ext cx="903388" cy="215444"/>
-          </a:xfrm>
-          <a:prstGeom prst="rect">
-            <a:avLst/>
-          </a:prstGeom>
-          <a:noFill/>
-          <a:ln w="3175">
-            <a:solidFill>
-              <a:schemeClr val="tx1">
-                <a:lumMod val="75000"/>
-                <a:lumOff val="25000"/>
-              </a:schemeClr>
-            </a:solidFill>
-          </a:ln>
-        </p:spPr>
-        <p:txBody>
-          <a:bodyPr wrap="square" rtlCol="0">
-            <a:spAutoFit/>
-          </a:bodyPr>
-          <a:lstStyle/>
-          <a:p>
-            <a:pPr algn="ctr"/>
-            <a:r>
-              <a:rPr lang="en-GB" sz="800" dirty="0">
-                <a:solidFill>
-                  <a:schemeClr val="tx1">
-                    <a:lumMod val="75000"/>
-                    <a:lumOff val="25000"/>
-                  </a:schemeClr>
-                </a:solidFill>
-              </a:rPr>
-              <a:t>T+72, Daytime</a:t>
-            </a:r>
-          </a:p>
-        </p:txBody>
-      </p:sp>
-      <p:sp>
-        <p:nvSpPr>
-          <p:cNvPr id="183" name="TextBox 113">
-            <a:extLst>
-              <a:ext uri="{FF2B5EF4-FFF2-40B4-BE49-F238E27FC236}">
-                <a16:creationId xmlns:a16="http://schemas.microsoft.com/office/drawing/2014/main" id="{A453E47F-3351-19E4-61A6-33A31FA0DB01}"/>
-              </a:ext>
-            </a:extLst>
-          </p:cNvPr>
-          <p:cNvSpPr txBox="1"/>
-          <p:nvPr/>
-        </p:nvSpPr>
-        <p:spPr>
-          <a:xfrm>
-            <a:off x="5435260" y="1549591"/>
-            <a:ext cx="598437" cy="215444"/>
-          </a:xfrm>
-          <a:prstGeom prst="rect">
-            <a:avLst/>
-          </a:prstGeom>
-          <a:noFill/>
-          <a:ln w="3175">
-            <a:solidFill>
-              <a:schemeClr val="tx1">
-                <a:lumMod val="75000"/>
-                <a:lumOff val="25000"/>
-              </a:schemeClr>
-            </a:solidFill>
-          </a:ln>
-        </p:spPr>
-        <p:txBody>
-          <a:bodyPr wrap="square" rtlCol="0">
-            <a:spAutoFit/>
-          </a:bodyPr>
-          <a:lstStyle/>
-          <a:p>
-            <a:pPr algn="ctr"/>
-            <a:r>
-              <a:rPr lang="en-GB" sz="800" dirty="0">
-                <a:solidFill>
-                  <a:schemeClr val="tx1">
-                    <a:lumMod val="75000"/>
-                    <a:lumOff val="25000"/>
-                  </a:schemeClr>
-                </a:solidFill>
-              </a:rPr>
-              <a:t>ecPoint</a:t>
-            </a:r>
-          </a:p>
-        </p:txBody>
-      </p:sp>
-      <p:sp>
-        <p:nvSpPr>
-          <p:cNvPr id="184" name="TextBox 117">
-            <a:extLst>
-              <a:ext uri="{FF2B5EF4-FFF2-40B4-BE49-F238E27FC236}">
-                <a16:creationId xmlns:a16="http://schemas.microsoft.com/office/drawing/2014/main" id="{06B4CEE1-3430-9BA3-6998-16C2EBB3D9B0}"/>
-              </a:ext>
-            </a:extLst>
-          </p:cNvPr>
-          <p:cNvSpPr txBox="1"/>
-          <p:nvPr/>
-        </p:nvSpPr>
-        <p:spPr>
-          <a:xfrm>
-            <a:off x="4147931" y="1554891"/>
-            <a:ext cx="598437" cy="215444"/>
-          </a:xfrm>
-          <a:prstGeom prst="rect">
-            <a:avLst/>
-          </a:prstGeom>
-          <a:noFill/>
-          <a:ln w="3175">
-            <a:solidFill>
-              <a:schemeClr val="tx1">
-                <a:lumMod val="75000"/>
-                <a:lumOff val="25000"/>
-              </a:schemeClr>
-            </a:solidFill>
-          </a:ln>
-        </p:spPr>
-        <p:txBody>
-          <a:bodyPr wrap="square" rtlCol="0">
-            <a:spAutoFit/>
-          </a:bodyPr>
-          <a:lstStyle/>
-          <a:p>
-            <a:pPr algn="ctr"/>
-            <a:r>
-              <a:rPr lang="en-GB" sz="800" dirty="0">
-                <a:solidFill>
-                  <a:schemeClr val="tx1">
-                    <a:lumMod val="75000"/>
-                    <a:lumOff val="25000"/>
-                  </a:schemeClr>
-                </a:solidFill>
-              </a:rPr>
-              <a:t>ENS</a:t>
-            </a:r>
-          </a:p>
-        </p:txBody>
-      </p:sp>
-      <p:sp>
-        <p:nvSpPr>
-          <p:cNvPr id="185" name="TextBox 238">
-            <a:extLst>
-              <a:ext uri="{FF2B5EF4-FFF2-40B4-BE49-F238E27FC236}">
-                <a16:creationId xmlns:a16="http://schemas.microsoft.com/office/drawing/2014/main" id="{B5948A02-D18B-5E23-304A-5AB957798DB1}"/>
-              </a:ext>
-            </a:extLst>
-          </p:cNvPr>
-          <p:cNvSpPr txBox="1"/>
-          <p:nvPr/>
-        </p:nvSpPr>
-        <p:spPr>
-          <a:xfrm>
-            <a:off x="4839455" y="2979262"/>
-            <a:ext cx="216000" cy="215444"/>
-          </a:xfrm>
-          <a:prstGeom prst="rect">
-            <a:avLst/>
-          </a:prstGeom>
-          <a:solidFill>
-            <a:schemeClr val="bg1"/>
-          </a:solidFill>
-          <a:ln w="3175">
-            <a:solidFill>
-              <a:schemeClr val="tx1">
-                <a:lumMod val="75000"/>
-                <a:lumOff val="25000"/>
-              </a:schemeClr>
-            </a:solidFill>
-          </a:ln>
-        </p:spPr>
-        <p:txBody>
-          <a:bodyPr wrap="square" rtlCol="0">
-            <a:spAutoFit/>
-          </a:bodyPr>
-          <a:lstStyle/>
-          <a:p>
-            <a:r>
-              <a:rPr lang="en-GB" sz="800" dirty="0">
-                <a:solidFill>
-                  <a:schemeClr val="tx1">
-                    <a:lumMod val="75000"/>
-                    <a:lumOff val="25000"/>
-                  </a:schemeClr>
-                </a:solidFill>
-              </a:rPr>
-              <a:t>c</a:t>
-            </a:r>
-          </a:p>
-        </p:txBody>
-      </p:sp>
-      <p:sp>
-        <p:nvSpPr>
-          <p:cNvPr id="186" name="TextBox 239">
-            <a:extLst>
-              <a:ext uri="{FF2B5EF4-FFF2-40B4-BE49-F238E27FC236}">
-                <a16:creationId xmlns:a16="http://schemas.microsoft.com/office/drawing/2014/main" id="{18AFC9C9-ED8B-D886-DAC0-623CF8736934}"/>
-              </a:ext>
-            </a:extLst>
-          </p:cNvPr>
-          <p:cNvSpPr txBox="1"/>
-          <p:nvPr/>
-        </p:nvSpPr>
-        <p:spPr>
-          <a:xfrm>
-            <a:off x="6123446" y="2979262"/>
-            <a:ext cx="216000" cy="215444"/>
-          </a:xfrm>
-          <a:prstGeom prst="rect">
-            <a:avLst/>
-          </a:prstGeom>
-          <a:solidFill>
-            <a:schemeClr val="bg1"/>
-          </a:solidFill>
-          <a:ln w="3175">
-            <a:solidFill>
-              <a:schemeClr val="tx1">
-                <a:lumMod val="75000"/>
-                <a:lumOff val="25000"/>
-              </a:schemeClr>
-            </a:solidFill>
-          </a:ln>
-        </p:spPr>
-        <p:txBody>
-          <a:bodyPr wrap="square" rtlCol="0">
-            <a:spAutoFit/>
-          </a:bodyPr>
-          <a:lstStyle/>
-          <a:p>
-            <a:r>
-              <a:rPr lang="en-GB" sz="800" dirty="0">
-                <a:solidFill>
-                  <a:schemeClr val="tx1">
-                    <a:lumMod val="75000"/>
-                    <a:lumOff val="25000"/>
-                  </a:schemeClr>
-                </a:solidFill>
-              </a:rPr>
-              <a:t>e</a:t>
-            </a:r>
-          </a:p>
-        </p:txBody>
-      </p:sp>
-      <p:sp>
-        <p:nvSpPr>
-          <p:cNvPr id="187" name="TextBox 240">
-            <a:extLst>
-              <a:ext uri="{FF2B5EF4-FFF2-40B4-BE49-F238E27FC236}">
-                <a16:creationId xmlns:a16="http://schemas.microsoft.com/office/drawing/2014/main" id="{35202108-D28B-BD0D-CB90-3B190EAE4087}"/>
-              </a:ext>
-            </a:extLst>
-          </p:cNvPr>
-          <p:cNvSpPr txBox="1"/>
-          <p:nvPr/>
-        </p:nvSpPr>
-        <p:spPr>
-          <a:xfrm>
-            <a:off x="4839455" y="4362617"/>
-            <a:ext cx="216000" cy="215444"/>
-          </a:xfrm>
-          <a:prstGeom prst="rect">
-            <a:avLst/>
-          </a:prstGeom>
-          <a:solidFill>
-            <a:schemeClr val="bg1"/>
-          </a:solidFill>
-          <a:ln w="3175">
-            <a:solidFill>
-              <a:schemeClr val="tx1">
-                <a:lumMod val="75000"/>
-                <a:lumOff val="25000"/>
-              </a:schemeClr>
-            </a:solidFill>
-          </a:ln>
-        </p:spPr>
-        <p:txBody>
-          <a:bodyPr wrap="square" rtlCol="0">
-            <a:spAutoFit/>
-          </a:bodyPr>
-          <a:lstStyle/>
-          <a:p>
-            <a:r>
-              <a:rPr lang="en-US" sz="800" dirty="0">
-                <a:solidFill>
-                  <a:schemeClr val="tx1">
-                    <a:lumMod val="75000"/>
-                    <a:lumOff val="25000"/>
-                  </a:schemeClr>
-                </a:solidFill>
-              </a:rPr>
-              <a:t>d</a:t>
-            </a:r>
-            <a:endParaRPr lang="en-GB" sz="800" dirty="0">
-              <a:solidFill>
-                <a:schemeClr val="tx1">
-                  <a:lumMod val="75000"/>
-                  <a:lumOff val="25000"/>
-                </a:schemeClr>
-              </a:solidFill>
-            </a:endParaRPr>
-          </a:p>
-        </p:txBody>
-      </p:sp>
-      <p:sp>
-        <p:nvSpPr>
-          <p:cNvPr id="188" name="TextBox 241">
-            <a:extLst>
-              <a:ext uri="{FF2B5EF4-FFF2-40B4-BE49-F238E27FC236}">
-                <a16:creationId xmlns:a16="http://schemas.microsoft.com/office/drawing/2014/main" id="{16140944-A7C1-A32B-8390-D386B3C88A3C}"/>
-              </a:ext>
-            </a:extLst>
-          </p:cNvPr>
-          <p:cNvSpPr txBox="1"/>
-          <p:nvPr/>
-        </p:nvSpPr>
-        <p:spPr>
-          <a:xfrm>
-            <a:off x="6123446" y="4362617"/>
-            <a:ext cx="216000" cy="215444"/>
-          </a:xfrm>
-          <a:prstGeom prst="rect">
-            <a:avLst/>
-          </a:prstGeom>
-          <a:solidFill>
-            <a:schemeClr val="bg1"/>
-          </a:solidFill>
-          <a:ln w="3175">
-            <a:solidFill>
-              <a:schemeClr val="tx1">
-                <a:lumMod val="75000"/>
-                <a:lumOff val="25000"/>
-              </a:schemeClr>
-            </a:solidFill>
-          </a:ln>
-        </p:spPr>
-        <p:txBody>
-          <a:bodyPr wrap="square" rtlCol="0">
-            <a:spAutoFit/>
-          </a:bodyPr>
-          <a:lstStyle/>
-          <a:p>
-            <a:r>
-              <a:rPr lang="en-GB" sz="800" dirty="0">
-                <a:solidFill>
-                  <a:schemeClr val="tx1">
-                    <a:lumMod val="75000"/>
-                    <a:lumOff val="25000"/>
-                  </a:schemeClr>
-                </a:solidFill>
-              </a:rPr>
-              <a:t>f</a:t>
-            </a:r>
-          </a:p>
-        </p:txBody>
-      </p:sp>
-      <p:sp>
-        <p:nvSpPr>
-          <p:cNvPr id="189" name="Oval 242">
-            <a:extLst>
-              <a:ext uri="{FF2B5EF4-FFF2-40B4-BE49-F238E27FC236}">
-                <a16:creationId xmlns:a16="http://schemas.microsoft.com/office/drawing/2014/main" id="{1D92883C-F747-A861-D0CF-F992EF569F00}"/>
-              </a:ext>
-            </a:extLst>
-          </p:cNvPr>
-          <p:cNvSpPr/>
-          <p:nvPr/>
-        </p:nvSpPr>
-        <p:spPr>
-          <a:xfrm>
-            <a:off x="5007886" y="656008"/>
-            <a:ext cx="36000" cy="36000"/>
-          </a:xfrm>
-          <a:prstGeom prst="ellipse">
-            <a:avLst/>
-          </a:prstGeom>
-          <a:solidFill>
-            <a:schemeClr val="tx1"/>
-          </a:solidFill>
-          <a:ln>
-            <a:noFill/>
-          </a:ln>
-        </p:spPr>
-        <p:style>
-          <a:lnRef idx="2">
-            <a:schemeClr val="accent1">
-              <a:shade val="50000"/>
-            </a:schemeClr>
-          </a:lnRef>
-          <a:fillRef idx="1">
-            <a:schemeClr val="accent1"/>
-          </a:fillRef>
-          <a:effectRef idx="0">
-            <a:schemeClr val="accent1"/>
-          </a:effectRef>
-          <a:fontRef idx="minor">
-            <a:schemeClr val="lt1"/>
-          </a:fontRef>
-        </p:style>
-        <p:txBody>
-          <a:bodyPr rtlCol="0" anchor="ctr"/>
-          <a:lstStyle/>
-          <a:p>
-            <a:pPr algn="ctr"/>
-            <a:endParaRPr lang="en-GB" dirty="0">
-              <a:solidFill>
-                <a:schemeClr val="tx1">
-                  <a:lumMod val="75000"/>
-                  <a:lumOff val="25000"/>
-                </a:schemeClr>
-              </a:solidFill>
-            </a:endParaRPr>
-          </a:p>
-        </p:txBody>
-      </p:sp>
-      <p:sp>
-        <p:nvSpPr>
-          <p:cNvPr id="190" name="TextBox 2106">
-            <a:extLst>
-              <a:ext uri="{FF2B5EF4-FFF2-40B4-BE49-F238E27FC236}">
-                <a16:creationId xmlns:a16="http://schemas.microsoft.com/office/drawing/2014/main" id="{1350C275-A6B7-25AF-80F7-AA1FB58163C2}"/>
-              </a:ext>
-            </a:extLst>
-          </p:cNvPr>
-          <p:cNvSpPr txBox="1"/>
-          <p:nvPr/>
-        </p:nvSpPr>
-        <p:spPr>
-          <a:xfrm>
-            <a:off x="3667140" y="686686"/>
-            <a:ext cx="2717492" cy="215444"/>
-          </a:xfrm>
-          <a:prstGeom prst="rect">
-            <a:avLst/>
-          </a:prstGeom>
-          <a:noFill/>
-        </p:spPr>
-        <p:txBody>
-          <a:bodyPr wrap="square" rtlCol="0">
-            <a:spAutoFit/>
-          </a:bodyPr>
-          <a:lstStyle/>
-          <a:p>
-            <a:pPr algn="ctr"/>
-            <a:r>
-              <a:rPr lang="en-GB" sz="800" dirty="0">
-                <a:solidFill>
-                  <a:schemeClr val="tx1">
-                    <a:lumMod val="75000"/>
-                    <a:lumOff val="25000"/>
-                  </a:schemeClr>
-                </a:solidFill>
-              </a:rPr>
-              <a:t>Location of rain gauges in “La Costa” and “La Sierra”</a:t>
-            </a:r>
-          </a:p>
-        </p:txBody>
-      </p:sp>
-      <p:sp>
-        <p:nvSpPr>
           <p:cNvPr id="191" name="TextBox 244">
             <a:extLst>
               <a:ext uri="{FF2B5EF4-FFF2-40B4-BE49-F238E27FC236}">
@@ -11815,7 +11240,7 @@
                   </a:schemeClr>
                 </a:solidFill>
               </a:rPr>
-              <a:t>2020’s 12-hourly rainfall average</a:t>
+              <a:t>Average of 2020’s 12-hourly rainfall</a:t>
             </a:r>
           </a:p>
         </p:txBody>
@@ -11929,6 +11354,566 @@
                 </a:schemeClr>
               </a:solidFill>
             </a:endParaRPr>
+          </a:p>
+        </p:txBody>
+      </p:sp>
+      <p:pic>
+        <p:nvPicPr>
+          <p:cNvPr id="2" name="Immagine 1" descr="Immagine che contiene testo, diagramma, schermata, linea&#10;&#10;Descrizione generata automaticamente">
+            <a:extLst>
+              <a:ext uri="{FF2B5EF4-FFF2-40B4-BE49-F238E27FC236}">
+                <a16:creationId xmlns:a16="http://schemas.microsoft.com/office/drawing/2014/main" id="{EDC92F73-5EDE-AEE4-BC75-0B0EE9B0CB52}"/>
+              </a:ext>
+            </a:extLst>
+          </p:cNvPr>
+          <p:cNvPicPr>
+            <a:picLocks noChangeAspect="1"/>
+          </p:cNvPicPr>
+          <p:nvPr/>
+        </p:nvPicPr>
+        <p:blipFill rotWithShape="1">
+          <a:blip r:embed="rId6">
+            <a:extLst>
+              <a:ext uri="{28A0092B-C50C-407E-A947-70E740481C1C}">
+                <a14:useLocalDpi xmlns:a14="http://schemas.microsoft.com/office/drawing/2010/main" val="0"/>
+              </a:ext>
+            </a:extLst>
+          </a:blip>
+          <a:srcRect l="7271" t="16915" r="39657" b="4407"/>
+          <a:stretch/>
+        </p:blipFill>
+        <p:spPr>
+          <a:xfrm>
+            <a:off x="5140888" y="1818365"/>
+            <a:ext cx="1300804" cy="1364400"/>
+          </a:xfrm>
+          <a:prstGeom prst="rect">
+            <a:avLst/>
+          </a:prstGeom>
+        </p:spPr>
+      </p:pic>
+      <p:pic>
+        <p:nvPicPr>
+          <p:cNvPr id="5" name="Immagine 4" descr="Immagine che contiene testo, schermata, diagramma, linea&#10;&#10;Descrizione generata automaticamente">
+            <a:extLst>
+              <a:ext uri="{FF2B5EF4-FFF2-40B4-BE49-F238E27FC236}">
+                <a16:creationId xmlns:a16="http://schemas.microsoft.com/office/drawing/2014/main" id="{F4BBE349-03C5-ABDC-674E-DBEE4E686C32}"/>
+              </a:ext>
+            </a:extLst>
+          </p:cNvPr>
+          <p:cNvPicPr>
+            <a:picLocks noChangeAspect="1"/>
+          </p:cNvPicPr>
+          <p:nvPr/>
+        </p:nvPicPr>
+        <p:blipFill rotWithShape="1">
+          <a:blip r:embed="rId7">
+            <a:extLst>
+              <a:ext uri="{28A0092B-C50C-407E-A947-70E740481C1C}">
+                <a14:useLocalDpi xmlns:a14="http://schemas.microsoft.com/office/drawing/2010/main" val="0"/>
+              </a:ext>
+            </a:extLst>
+          </a:blip>
+          <a:srcRect l="7271" t="19149" r="39657" b="2173"/>
+          <a:stretch/>
+        </p:blipFill>
+        <p:spPr>
+          <a:xfrm>
+            <a:off x="5140888" y="3192896"/>
+            <a:ext cx="1300804" cy="1364400"/>
+          </a:xfrm>
+          <a:prstGeom prst="rect">
+            <a:avLst/>
+          </a:prstGeom>
+        </p:spPr>
+      </p:pic>
+      <p:pic>
+        <p:nvPicPr>
+          <p:cNvPr id="7" name="Immagine 6" descr="Immagine che contiene testo, schermata, diagramma, Policromia&#10;&#10;Descrizione generata automaticamente">
+            <a:extLst>
+              <a:ext uri="{FF2B5EF4-FFF2-40B4-BE49-F238E27FC236}">
+                <a16:creationId xmlns:a16="http://schemas.microsoft.com/office/drawing/2014/main" id="{32449396-FC05-D33F-7D1F-EE4676157768}"/>
+              </a:ext>
+            </a:extLst>
+          </p:cNvPr>
+          <p:cNvPicPr>
+            <a:picLocks noChangeAspect="1"/>
+          </p:cNvPicPr>
+          <p:nvPr/>
+        </p:nvPicPr>
+        <p:blipFill rotWithShape="1">
+          <a:blip r:embed="rId8">
+            <a:extLst>
+              <a:ext uri="{28A0092B-C50C-407E-A947-70E740481C1C}">
+                <a14:useLocalDpi xmlns:a14="http://schemas.microsoft.com/office/drawing/2010/main" val="0"/>
+              </a:ext>
+            </a:extLst>
+          </a:blip>
+          <a:srcRect l="3785" t="16915" r="42564" b="4407"/>
+          <a:stretch/>
+        </p:blipFill>
+        <p:spPr>
+          <a:xfrm>
+            <a:off x="3808263" y="1818365"/>
+            <a:ext cx="1315011" cy="1364400"/>
+          </a:xfrm>
+          <a:prstGeom prst="rect">
+            <a:avLst/>
+          </a:prstGeom>
+        </p:spPr>
+      </p:pic>
+      <p:pic>
+        <p:nvPicPr>
+          <p:cNvPr id="8" name="Immagine 7" descr="Immagine che contiene testo, diagramma, schermata, Policromia&#10;&#10;Descrizione generata automaticamente">
+            <a:extLst>
+              <a:ext uri="{FF2B5EF4-FFF2-40B4-BE49-F238E27FC236}">
+                <a16:creationId xmlns:a16="http://schemas.microsoft.com/office/drawing/2014/main" id="{33243045-1C82-47E1-8D1F-A571BAAB13A7}"/>
+              </a:ext>
+            </a:extLst>
+          </p:cNvPr>
+          <p:cNvPicPr>
+            <a:picLocks noChangeAspect="1"/>
+          </p:cNvPicPr>
+          <p:nvPr/>
+        </p:nvPicPr>
+        <p:blipFill rotWithShape="1">
+          <a:blip r:embed="rId9">
+            <a:extLst>
+              <a:ext uri="{28A0092B-C50C-407E-A947-70E740481C1C}">
+                <a14:useLocalDpi xmlns:a14="http://schemas.microsoft.com/office/drawing/2010/main" val="0"/>
+              </a:ext>
+            </a:extLst>
+          </a:blip>
+          <a:srcRect l="3785" t="19149" r="42564" b="2173"/>
+          <a:stretch/>
+        </p:blipFill>
+        <p:spPr>
+          <a:xfrm>
+            <a:off x="3808263" y="3192896"/>
+            <a:ext cx="1315011" cy="1364400"/>
+          </a:xfrm>
+          <a:prstGeom prst="rect">
+            <a:avLst/>
+          </a:prstGeom>
+        </p:spPr>
+      </p:pic>
+      <p:sp>
+        <p:nvSpPr>
+          <p:cNvPr id="149" name="TextBox 115">
+            <a:extLst>
+              <a:ext uri="{FF2B5EF4-FFF2-40B4-BE49-F238E27FC236}">
+                <a16:creationId xmlns:a16="http://schemas.microsoft.com/office/drawing/2014/main" id="{B2D9AE0E-D7BB-624F-E92F-9B8205F1044A}"/>
+              </a:ext>
+            </a:extLst>
+          </p:cNvPr>
+          <p:cNvSpPr txBox="1"/>
+          <p:nvPr/>
+        </p:nvSpPr>
+        <p:spPr>
+          <a:xfrm rot="16200000">
+            <a:off x="3120763" y="2392844"/>
+            <a:ext cx="903388" cy="215444"/>
+          </a:xfrm>
+          <a:prstGeom prst="rect">
+            <a:avLst/>
+          </a:prstGeom>
+          <a:noFill/>
+          <a:ln w="3175">
+            <a:solidFill>
+              <a:schemeClr val="tx1">
+                <a:lumMod val="75000"/>
+                <a:lumOff val="25000"/>
+              </a:schemeClr>
+            </a:solidFill>
+          </a:ln>
+        </p:spPr>
+        <p:txBody>
+          <a:bodyPr wrap="square" rtlCol="0">
+            <a:spAutoFit/>
+          </a:bodyPr>
+          <a:lstStyle/>
+          <a:p>
+            <a:pPr algn="ctr"/>
+            <a:r>
+              <a:rPr lang="en-GB" sz="800" dirty="0">
+                <a:solidFill>
+                  <a:schemeClr val="tx1">
+                    <a:lumMod val="75000"/>
+                    <a:lumOff val="25000"/>
+                  </a:schemeClr>
+                </a:solidFill>
+              </a:rPr>
+              <a:t>T+60, Nighttime</a:t>
+            </a:r>
+          </a:p>
+        </p:txBody>
+      </p:sp>
+      <p:sp>
+        <p:nvSpPr>
+          <p:cNvPr id="171" name="TextBox 116">
+            <a:extLst>
+              <a:ext uri="{FF2B5EF4-FFF2-40B4-BE49-F238E27FC236}">
+                <a16:creationId xmlns:a16="http://schemas.microsoft.com/office/drawing/2014/main" id="{D25BDD5B-14E5-0149-483D-A4306A0EC11C}"/>
+              </a:ext>
+            </a:extLst>
+          </p:cNvPr>
+          <p:cNvSpPr txBox="1"/>
+          <p:nvPr/>
+        </p:nvSpPr>
+        <p:spPr>
+          <a:xfrm rot="16200000">
+            <a:off x="3120762" y="3767374"/>
+            <a:ext cx="903388" cy="215444"/>
+          </a:xfrm>
+          <a:prstGeom prst="rect">
+            <a:avLst/>
+          </a:prstGeom>
+          <a:noFill/>
+          <a:ln w="3175">
+            <a:solidFill>
+              <a:schemeClr val="tx1">
+                <a:lumMod val="75000"/>
+                <a:lumOff val="25000"/>
+              </a:schemeClr>
+            </a:solidFill>
+          </a:ln>
+        </p:spPr>
+        <p:txBody>
+          <a:bodyPr wrap="square" rtlCol="0">
+            <a:spAutoFit/>
+          </a:bodyPr>
+          <a:lstStyle/>
+          <a:p>
+            <a:pPr algn="ctr"/>
+            <a:r>
+              <a:rPr lang="en-GB" sz="800" dirty="0">
+                <a:solidFill>
+                  <a:schemeClr val="tx1">
+                    <a:lumMod val="75000"/>
+                    <a:lumOff val="25000"/>
+                  </a:schemeClr>
+                </a:solidFill>
+              </a:rPr>
+              <a:t>T+72, Daytime</a:t>
+            </a:r>
+          </a:p>
+        </p:txBody>
+      </p:sp>
+      <p:sp>
+        <p:nvSpPr>
+          <p:cNvPr id="183" name="TextBox 113">
+            <a:extLst>
+              <a:ext uri="{FF2B5EF4-FFF2-40B4-BE49-F238E27FC236}">
+                <a16:creationId xmlns:a16="http://schemas.microsoft.com/office/drawing/2014/main" id="{A453E47F-3351-19E4-61A6-33A31FA0DB01}"/>
+              </a:ext>
+            </a:extLst>
+          </p:cNvPr>
+          <p:cNvSpPr txBox="1"/>
+          <p:nvPr/>
+        </p:nvSpPr>
+        <p:spPr>
+          <a:xfrm>
+            <a:off x="5492072" y="1549591"/>
+            <a:ext cx="598437" cy="215444"/>
+          </a:xfrm>
+          <a:prstGeom prst="rect">
+            <a:avLst/>
+          </a:prstGeom>
+          <a:noFill/>
+          <a:ln w="3175">
+            <a:solidFill>
+              <a:schemeClr val="tx1">
+                <a:lumMod val="75000"/>
+                <a:lumOff val="25000"/>
+              </a:schemeClr>
+            </a:solidFill>
+          </a:ln>
+        </p:spPr>
+        <p:txBody>
+          <a:bodyPr wrap="square" rtlCol="0">
+            <a:spAutoFit/>
+          </a:bodyPr>
+          <a:lstStyle/>
+          <a:p>
+            <a:pPr algn="ctr"/>
+            <a:r>
+              <a:rPr lang="en-GB" sz="800" dirty="0">
+                <a:solidFill>
+                  <a:schemeClr val="tx1">
+                    <a:lumMod val="75000"/>
+                    <a:lumOff val="25000"/>
+                  </a:schemeClr>
+                </a:solidFill>
+              </a:rPr>
+              <a:t>ecPoint</a:t>
+            </a:r>
+          </a:p>
+        </p:txBody>
+      </p:sp>
+      <p:sp>
+        <p:nvSpPr>
+          <p:cNvPr id="184" name="TextBox 117">
+            <a:extLst>
+              <a:ext uri="{FF2B5EF4-FFF2-40B4-BE49-F238E27FC236}">
+                <a16:creationId xmlns:a16="http://schemas.microsoft.com/office/drawing/2014/main" id="{06B4CEE1-3430-9BA3-6998-16C2EBB3D9B0}"/>
+              </a:ext>
+            </a:extLst>
+          </p:cNvPr>
+          <p:cNvSpPr txBox="1"/>
+          <p:nvPr/>
+        </p:nvSpPr>
+        <p:spPr>
+          <a:xfrm>
+            <a:off x="4166550" y="1554891"/>
+            <a:ext cx="598437" cy="215444"/>
+          </a:xfrm>
+          <a:prstGeom prst="rect">
+            <a:avLst/>
+          </a:prstGeom>
+          <a:noFill/>
+          <a:ln w="3175">
+            <a:solidFill>
+              <a:schemeClr val="tx1">
+                <a:lumMod val="75000"/>
+                <a:lumOff val="25000"/>
+              </a:schemeClr>
+            </a:solidFill>
+          </a:ln>
+        </p:spPr>
+        <p:txBody>
+          <a:bodyPr wrap="square" rtlCol="0">
+            <a:spAutoFit/>
+          </a:bodyPr>
+          <a:lstStyle/>
+          <a:p>
+            <a:pPr algn="ctr"/>
+            <a:r>
+              <a:rPr lang="en-GB" sz="800" dirty="0">
+                <a:solidFill>
+                  <a:schemeClr val="tx1">
+                    <a:lumMod val="75000"/>
+                    <a:lumOff val="25000"/>
+                  </a:schemeClr>
+                </a:solidFill>
+              </a:rPr>
+              <a:t>ENS</a:t>
+            </a:r>
+          </a:p>
+        </p:txBody>
+      </p:sp>
+      <p:sp>
+        <p:nvSpPr>
+          <p:cNvPr id="185" name="TextBox 238">
+            <a:extLst>
+              <a:ext uri="{FF2B5EF4-FFF2-40B4-BE49-F238E27FC236}">
+                <a16:creationId xmlns:a16="http://schemas.microsoft.com/office/drawing/2014/main" id="{B5948A02-D18B-5E23-304A-5AB957798DB1}"/>
+              </a:ext>
+            </a:extLst>
+          </p:cNvPr>
+          <p:cNvSpPr txBox="1"/>
+          <p:nvPr/>
+        </p:nvSpPr>
+        <p:spPr>
+          <a:xfrm>
+            <a:off x="4878530" y="2932372"/>
+            <a:ext cx="216000" cy="215444"/>
+          </a:xfrm>
+          <a:prstGeom prst="rect">
+            <a:avLst/>
+          </a:prstGeom>
+          <a:solidFill>
+            <a:schemeClr val="bg1"/>
+          </a:solidFill>
+          <a:ln w="3175">
+            <a:solidFill>
+              <a:schemeClr val="tx1">
+                <a:lumMod val="75000"/>
+                <a:lumOff val="25000"/>
+              </a:schemeClr>
+            </a:solidFill>
+          </a:ln>
+        </p:spPr>
+        <p:txBody>
+          <a:bodyPr wrap="square" rtlCol="0">
+            <a:spAutoFit/>
+          </a:bodyPr>
+          <a:lstStyle/>
+          <a:p>
+            <a:r>
+              <a:rPr lang="en-GB" sz="800" dirty="0">
+                <a:solidFill>
+                  <a:schemeClr val="tx1">
+                    <a:lumMod val="75000"/>
+                    <a:lumOff val="25000"/>
+                  </a:schemeClr>
+                </a:solidFill>
+              </a:rPr>
+              <a:t>c</a:t>
+            </a:r>
+          </a:p>
+        </p:txBody>
+      </p:sp>
+      <p:sp>
+        <p:nvSpPr>
+          <p:cNvPr id="186" name="TextBox 239">
+            <a:extLst>
+              <a:ext uri="{FF2B5EF4-FFF2-40B4-BE49-F238E27FC236}">
+                <a16:creationId xmlns:a16="http://schemas.microsoft.com/office/drawing/2014/main" id="{18AFC9C9-ED8B-D886-DAC0-623CF8736934}"/>
+              </a:ext>
+            </a:extLst>
+          </p:cNvPr>
+          <p:cNvSpPr txBox="1"/>
+          <p:nvPr/>
+        </p:nvSpPr>
+        <p:spPr>
+          <a:xfrm>
+            <a:off x="6115631" y="2932372"/>
+            <a:ext cx="216000" cy="215444"/>
+          </a:xfrm>
+          <a:prstGeom prst="rect">
+            <a:avLst/>
+          </a:prstGeom>
+          <a:solidFill>
+            <a:schemeClr val="bg1"/>
+          </a:solidFill>
+          <a:ln w="3175">
+            <a:solidFill>
+              <a:schemeClr val="tx1">
+                <a:lumMod val="75000"/>
+                <a:lumOff val="25000"/>
+              </a:schemeClr>
+            </a:solidFill>
+          </a:ln>
+        </p:spPr>
+        <p:txBody>
+          <a:bodyPr wrap="square" rtlCol="0">
+            <a:spAutoFit/>
+          </a:bodyPr>
+          <a:lstStyle/>
+          <a:p>
+            <a:r>
+              <a:rPr lang="en-GB" sz="800" dirty="0">
+                <a:solidFill>
+                  <a:schemeClr val="tx1">
+                    <a:lumMod val="75000"/>
+                    <a:lumOff val="25000"/>
+                  </a:schemeClr>
+                </a:solidFill>
+              </a:rPr>
+              <a:t>e</a:t>
+            </a:r>
+          </a:p>
+        </p:txBody>
+      </p:sp>
+      <p:sp>
+        <p:nvSpPr>
+          <p:cNvPr id="187" name="TextBox 240">
+            <a:extLst>
+              <a:ext uri="{FF2B5EF4-FFF2-40B4-BE49-F238E27FC236}">
+                <a16:creationId xmlns:a16="http://schemas.microsoft.com/office/drawing/2014/main" id="{35202108-D28B-BD0D-CB90-3B190EAE4087}"/>
+              </a:ext>
+            </a:extLst>
+          </p:cNvPr>
+          <p:cNvSpPr txBox="1"/>
+          <p:nvPr/>
+        </p:nvSpPr>
+        <p:spPr>
+          <a:xfrm>
+            <a:off x="4878530" y="4268837"/>
+            <a:ext cx="216000" cy="215444"/>
+          </a:xfrm>
+          <a:prstGeom prst="rect">
+            <a:avLst/>
+          </a:prstGeom>
+          <a:solidFill>
+            <a:schemeClr val="bg1"/>
+          </a:solidFill>
+          <a:ln w="3175">
+            <a:solidFill>
+              <a:schemeClr val="tx1">
+                <a:lumMod val="75000"/>
+                <a:lumOff val="25000"/>
+              </a:schemeClr>
+            </a:solidFill>
+          </a:ln>
+        </p:spPr>
+        <p:txBody>
+          <a:bodyPr wrap="square" rtlCol="0">
+            <a:spAutoFit/>
+          </a:bodyPr>
+          <a:lstStyle/>
+          <a:p>
+            <a:r>
+              <a:rPr lang="en-US" sz="800" dirty="0">
+                <a:solidFill>
+                  <a:schemeClr val="tx1">
+                    <a:lumMod val="75000"/>
+                    <a:lumOff val="25000"/>
+                  </a:schemeClr>
+                </a:solidFill>
+              </a:rPr>
+              <a:t>d</a:t>
+            </a:r>
+            <a:endParaRPr lang="en-GB" sz="800" dirty="0">
+              <a:solidFill>
+                <a:schemeClr val="tx1">
+                  <a:lumMod val="75000"/>
+                  <a:lumOff val="25000"/>
+                </a:schemeClr>
+              </a:solidFill>
+            </a:endParaRPr>
+          </a:p>
+        </p:txBody>
+      </p:sp>
+      <p:sp>
+        <p:nvSpPr>
+          <p:cNvPr id="188" name="TextBox 241">
+            <a:extLst>
+              <a:ext uri="{FF2B5EF4-FFF2-40B4-BE49-F238E27FC236}">
+                <a16:creationId xmlns:a16="http://schemas.microsoft.com/office/drawing/2014/main" id="{16140944-A7C1-A32B-8390-D386B3C88A3C}"/>
+              </a:ext>
+            </a:extLst>
+          </p:cNvPr>
+          <p:cNvSpPr txBox="1"/>
+          <p:nvPr/>
+        </p:nvSpPr>
+        <p:spPr>
+          <a:xfrm>
+            <a:off x="6115631" y="4268837"/>
+            <a:ext cx="216000" cy="215444"/>
+          </a:xfrm>
+          <a:prstGeom prst="rect">
+            <a:avLst/>
+          </a:prstGeom>
+          <a:solidFill>
+            <a:schemeClr val="bg1"/>
+          </a:solidFill>
+          <a:ln w="3175">
+            <a:solidFill>
+              <a:schemeClr val="tx1">
+                <a:lumMod val="75000"/>
+                <a:lumOff val="25000"/>
+              </a:schemeClr>
+            </a:solidFill>
+          </a:ln>
+        </p:spPr>
+        <p:txBody>
+          <a:bodyPr wrap="square" rtlCol="0">
+            <a:spAutoFit/>
+          </a:bodyPr>
+          <a:lstStyle/>
+          <a:p>
+            <a:r>
+              <a:rPr lang="en-GB" sz="800" dirty="0">
+                <a:solidFill>
+                  <a:schemeClr val="tx1">
+                    <a:lumMod val="75000"/>
+                    <a:lumOff val="25000"/>
+                  </a:schemeClr>
+                </a:solidFill>
+              </a:rPr>
+              <a:t>f</a:t>
+            </a:r>
           </a:p>
         </p:txBody>
       </p:sp>

</xml_diff>

<commit_message>
Completed figures in manuscript
</commit_message>
<xml_diff>
--- a/Manuscript/Figures/03_DATA_Annual_Average_Rainfall.pptx
+++ b/Manuscript/Figures/03_DATA_Annual_Average_Rainfall.pptx
@@ -125,12 +125,12 @@
   <pc:docChgLst>
     <pc:chgData name="Fatima Pillosu" userId="a6295d4dc9e22643" providerId="LiveId" clId="{E4EB9531-B35B-4F76-8762-A23C9D2F4928}"/>
     <pc:docChg chg="undo custSel addSld delSld modSld">
-      <pc:chgData name="Fatima Pillosu" userId="a6295d4dc9e22643" providerId="LiveId" clId="{E4EB9531-B35B-4F76-8762-A23C9D2F4928}" dt="2023-11-08T22:39:33.949" v="516" actId="47"/>
+      <pc:chgData name="Fatima Pillosu" userId="a6295d4dc9e22643" providerId="LiveId" clId="{E4EB9531-B35B-4F76-8762-A23C9D2F4928}" dt="2023-11-13T17:28:48.746" v="556" actId="20577"/>
       <pc:docMkLst>
         <pc:docMk/>
       </pc:docMkLst>
       <pc:sldChg chg="addSp delSp modSp mod">
-        <pc:chgData name="Fatima Pillosu" userId="a6295d4dc9e22643" providerId="LiveId" clId="{E4EB9531-B35B-4F76-8762-A23C9D2F4928}" dt="2023-11-08T22:38:19.835" v="515" actId="1037"/>
+        <pc:chgData name="Fatima Pillosu" userId="a6295d4dc9e22643" providerId="LiveId" clId="{E4EB9531-B35B-4F76-8762-A23C9D2F4928}" dt="2023-11-13T17:28:48.746" v="556" actId="20577"/>
         <pc:sldMkLst>
           <pc:docMk/>
           <pc:sldMk cId="1967199282" sldId="256"/>
@@ -1704,7 +1704,7 @@
           </ac:spMkLst>
         </pc:spChg>
         <pc:spChg chg="add mod">
-          <ac:chgData name="Fatima Pillosu" userId="a6295d4dc9e22643" providerId="LiveId" clId="{E4EB9531-B35B-4F76-8762-A23C9D2F4928}" dt="2023-11-08T22:32:18.293" v="339" actId="20577"/>
+          <ac:chgData name="Fatima Pillosu" userId="a6295d4dc9e22643" providerId="LiveId" clId="{E4EB9531-B35B-4F76-8762-A23C9D2F4928}" dt="2023-11-13T17:28:48.746" v="556" actId="20577"/>
           <ac:spMkLst>
             <pc:docMk/>
             <pc:sldMk cId="1967199282" sldId="256"/>
@@ -2751,7 +2751,7 @@
           <a:p>
             <a:fld id="{BE66BE40-8B0C-4A52-BD4D-0C8256116241}" type="datetimeFigureOut">
               <a:rPr lang="en-GB" smtClean="0"/>
-              <a:t>08/11/2023</a:t>
+              <a:t>13/11/2023</a:t>
             </a:fld>
             <a:endParaRPr lang="en-GB"/>
           </a:p>
@@ -2921,7 +2921,7 @@
           <a:p>
             <a:fld id="{BE66BE40-8B0C-4A52-BD4D-0C8256116241}" type="datetimeFigureOut">
               <a:rPr lang="en-GB" smtClean="0"/>
-              <a:t>08/11/2023</a:t>
+              <a:t>13/11/2023</a:t>
             </a:fld>
             <a:endParaRPr lang="en-GB"/>
           </a:p>
@@ -3101,7 +3101,7 @@
           <a:p>
             <a:fld id="{BE66BE40-8B0C-4A52-BD4D-0C8256116241}" type="datetimeFigureOut">
               <a:rPr lang="en-GB" smtClean="0"/>
-              <a:t>08/11/2023</a:t>
+              <a:t>13/11/2023</a:t>
             </a:fld>
             <a:endParaRPr lang="en-GB"/>
           </a:p>
@@ -3271,7 +3271,7 @@
           <a:p>
             <a:fld id="{BE66BE40-8B0C-4A52-BD4D-0C8256116241}" type="datetimeFigureOut">
               <a:rPr lang="en-GB" smtClean="0"/>
-              <a:t>08/11/2023</a:t>
+              <a:t>13/11/2023</a:t>
             </a:fld>
             <a:endParaRPr lang="en-GB"/>
           </a:p>
@@ -3515,7 +3515,7 @@
           <a:p>
             <a:fld id="{BE66BE40-8B0C-4A52-BD4D-0C8256116241}" type="datetimeFigureOut">
               <a:rPr lang="en-GB" smtClean="0"/>
-              <a:t>08/11/2023</a:t>
+              <a:t>13/11/2023</a:t>
             </a:fld>
             <a:endParaRPr lang="en-GB"/>
           </a:p>
@@ -3747,7 +3747,7 @@
           <a:p>
             <a:fld id="{BE66BE40-8B0C-4A52-BD4D-0C8256116241}" type="datetimeFigureOut">
               <a:rPr lang="en-GB" smtClean="0"/>
-              <a:t>08/11/2023</a:t>
+              <a:t>13/11/2023</a:t>
             </a:fld>
             <a:endParaRPr lang="en-GB"/>
           </a:p>
@@ -4114,7 +4114,7 @@
           <a:p>
             <a:fld id="{BE66BE40-8B0C-4A52-BD4D-0C8256116241}" type="datetimeFigureOut">
               <a:rPr lang="en-GB" smtClean="0"/>
-              <a:t>08/11/2023</a:t>
+              <a:t>13/11/2023</a:t>
             </a:fld>
             <a:endParaRPr lang="en-GB"/>
           </a:p>
@@ -4232,7 +4232,7 @@
           <a:p>
             <a:fld id="{BE66BE40-8B0C-4A52-BD4D-0C8256116241}" type="datetimeFigureOut">
               <a:rPr lang="en-GB" smtClean="0"/>
-              <a:t>08/11/2023</a:t>
+              <a:t>13/11/2023</a:t>
             </a:fld>
             <a:endParaRPr lang="en-GB"/>
           </a:p>
@@ -4327,7 +4327,7 @@
           <a:p>
             <a:fld id="{BE66BE40-8B0C-4A52-BD4D-0C8256116241}" type="datetimeFigureOut">
               <a:rPr lang="en-GB" smtClean="0"/>
-              <a:t>08/11/2023</a:t>
+              <a:t>13/11/2023</a:t>
             </a:fld>
             <a:endParaRPr lang="en-GB"/>
           </a:p>
@@ -4604,7 +4604,7 @@
           <a:p>
             <a:fld id="{BE66BE40-8B0C-4A52-BD4D-0C8256116241}" type="datetimeFigureOut">
               <a:rPr lang="en-GB" smtClean="0"/>
-              <a:t>08/11/2023</a:t>
+              <a:t>13/11/2023</a:t>
             </a:fld>
             <a:endParaRPr lang="en-GB"/>
           </a:p>
@@ -4861,7 +4861,7 @@
           <a:p>
             <a:fld id="{BE66BE40-8B0C-4A52-BD4D-0C8256116241}" type="datetimeFigureOut">
               <a:rPr lang="en-GB" smtClean="0"/>
-              <a:t>08/11/2023</a:t>
+              <a:t>13/11/2023</a:t>
             </a:fld>
             <a:endParaRPr lang="en-GB"/>
           </a:p>
@@ -5074,7 +5074,7 @@
           <a:p>
             <a:fld id="{BE66BE40-8B0C-4A52-BD4D-0C8256116241}" type="datetimeFigureOut">
               <a:rPr lang="en-GB" smtClean="0"/>
-              <a:t>08/11/2023</a:t>
+              <a:t>13/11/2023</a:t>
             </a:fld>
             <a:endParaRPr lang="en-GB"/>
           </a:p>
@@ -11240,8 +11240,27 @@
                   </a:schemeClr>
                 </a:solidFill>
               </a:rPr>
-              <a:t>Average of 2020’s 12-hourly rainfall</a:t>
-            </a:r>
+              <a:t>Average of 2020’s 12-hourly rainfall from forecasts </a:t>
+            </a:r>
+            <a:r>
+              <a:rPr lang="en-GB" sz="1000" b="1">
+                <a:solidFill>
+                  <a:schemeClr val="tx1">
+                    <a:lumMod val="75000"/>
+                    <a:lumOff val="25000"/>
+                  </a:schemeClr>
+                </a:solidFill>
+              </a:rPr>
+              <a:t>and SYNOP observations</a:t>
+            </a:r>
+            <a:endParaRPr lang="en-GB" sz="1000" b="1" dirty="0">
+              <a:solidFill>
+                <a:schemeClr val="tx1">
+                  <a:lumMod val="75000"/>
+                  <a:lumOff val="25000"/>
+                </a:schemeClr>
+              </a:solidFill>
+            </a:endParaRPr>
           </a:p>
         </p:txBody>
       </p:sp>

</xml_diff>

<commit_message>
Sorted all captions and revised sections up to n.6
</commit_message>
<xml_diff>
--- a/Manuscript/Figures/03_DATA_Annual_Average_Rainfall.pptx
+++ b/Manuscript/Figures/03_DATA_Annual_Average_Rainfall.pptx
@@ -125,12 +125,12 @@
   <pc:docChgLst>
     <pc:chgData name="Fatima Pillosu" userId="a6295d4dc9e22643" providerId="LiveId" clId="{E4EB9531-B35B-4F76-8762-A23C9D2F4928}"/>
     <pc:docChg chg="undo custSel addSld delSld modSld">
-      <pc:chgData name="Fatima Pillosu" userId="a6295d4dc9e22643" providerId="LiveId" clId="{E4EB9531-B35B-4F76-8762-A23C9D2F4928}" dt="2023-11-13T17:28:48.746" v="556" actId="20577"/>
+      <pc:chgData name="Fatima Pillosu" userId="a6295d4dc9e22643" providerId="LiveId" clId="{E4EB9531-B35B-4F76-8762-A23C9D2F4928}" dt="2023-11-19T15:38:13.231" v="561" actId="20577"/>
       <pc:docMkLst>
         <pc:docMk/>
       </pc:docMkLst>
       <pc:sldChg chg="addSp delSp modSp mod">
-        <pc:chgData name="Fatima Pillosu" userId="a6295d4dc9e22643" providerId="LiveId" clId="{E4EB9531-B35B-4F76-8762-A23C9D2F4928}" dt="2023-11-13T17:28:48.746" v="556" actId="20577"/>
+        <pc:chgData name="Fatima Pillosu" userId="a6295d4dc9e22643" providerId="LiveId" clId="{E4EB9531-B35B-4F76-8762-A23C9D2F4928}" dt="2023-11-19T15:38:13.231" v="561" actId="20577"/>
         <pc:sldMkLst>
           <pc:docMk/>
           <pc:sldMk cId="1967199282" sldId="256"/>
@@ -1608,7 +1608,7 @@
           </ac:spMkLst>
         </pc:spChg>
         <pc:spChg chg="add mod">
-          <ac:chgData name="Fatima Pillosu" userId="a6295d4dc9e22643" providerId="LiveId" clId="{E4EB9531-B35B-4F76-8762-A23C9D2F4928}" dt="2023-11-06T21:57:52.980" v="155"/>
+          <ac:chgData name="Fatima Pillosu" userId="a6295d4dc9e22643" providerId="LiveId" clId="{E4EB9531-B35B-4F76-8762-A23C9D2F4928}" dt="2023-11-19T15:38:13.231" v="561" actId="20577"/>
           <ac:spMkLst>
             <pc:docMk/>
             <pc:sldMk cId="1967199282" sldId="256"/>
@@ -2751,7 +2751,7 @@
           <a:p>
             <a:fld id="{BE66BE40-8B0C-4A52-BD4D-0C8256116241}" type="datetimeFigureOut">
               <a:rPr lang="en-GB" smtClean="0"/>
-              <a:t>13/11/2023</a:t>
+              <a:t>19/11/2023</a:t>
             </a:fld>
             <a:endParaRPr lang="en-GB"/>
           </a:p>
@@ -2921,7 +2921,7 @@
           <a:p>
             <a:fld id="{BE66BE40-8B0C-4A52-BD4D-0C8256116241}" type="datetimeFigureOut">
               <a:rPr lang="en-GB" smtClean="0"/>
-              <a:t>13/11/2023</a:t>
+              <a:t>19/11/2023</a:t>
             </a:fld>
             <a:endParaRPr lang="en-GB"/>
           </a:p>
@@ -3101,7 +3101,7 @@
           <a:p>
             <a:fld id="{BE66BE40-8B0C-4A52-BD4D-0C8256116241}" type="datetimeFigureOut">
               <a:rPr lang="en-GB" smtClean="0"/>
-              <a:t>13/11/2023</a:t>
+              <a:t>19/11/2023</a:t>
             </a:fld>
             <a:endParaRPr lang="en-GB"/>
           </a:p>
@@ -3271,7 +3271,7 @@
           <a:p>
             <a:fld id="{BE66BE40-8B0C-4A52-BD4D-0C8256116241}" type="datetimeFigureOut">
               <a:rPr lang="en-GB" smtClean="0"/>
-              <a:t>13/11/2023</a:t>
+              <a:t>19/11/2023</a:t>
             </a:fld>
             <a:endParaRPr lang="en-GB"/>
           </a:p>
@@ -3515,7 +3515,7 @@
           <a:p>
             <a:fld id="{BE66BE40-8B0C-4A52-BD4D-0C8256116241}" type="datetimeFigureOut">
               <a:rPr lang="en-GB" smtClean="0"/>
-              <a:t>13/11/2023</a:t>
+              <a:t>19/11/2023</a:t>
             </a:fld>
             <a:endParaRPr lang="en-GB"/>
           </a:p>
@@ -3747,7 +3747,7 @@
           <a:p>
             <a:fld id="{BE66BE40-8B0C-4A52-BD4D-0C8256116241}" type="datetimeFigureOut">
               <a:rPr lang="en-GB" smtClean="0"/>
-              <a:t>13/11/2023</a:t>
+              <a:t>19/11/2023</a:t>
             </a:fld>
             <a:endParaRPr lang="en-GB"/>
           </a:p>
@@ -4114,7 +4114,7 @@
           <a:p>
             <a:fld id="{BE66BE40-8B0C-4A52-BD4D-0C8256116241}" type="datetimeFigureOut">
               <a:rPr lang="en-GB" smtClean="0"/>
-              <a:t>13/11/2023</a:t>
+              <a:t>19/11/2023</a:t>
             </a:fld>
             <a:endParaRPr lang="en-GB"/>
           </a:p>
@@ -4232,7 +4232,7 @@
           <a:p>
             <a:fld id="{BE66BE40-8B0C-4A52-BD4D-0C8256116241}" type="datetimeFigureOut">
               <a:rPr lang="en-GB" smtClean="0"/>
-              <a:t>13/11/2023</a:t>
+              <a:t>19/11/2023</a:t>
             </a:fld>
             <a:endParaRPr lang="en-GB"/>
           </a:p>
@@ -4327,7 +4327,7 @@
           <a:p>
             <a:fld id="{BE66BE40-8B0C-4A52-BD4D-0C8256116241}" type="datetimeFigureOut">
               <a:rPr lang="en-GB" smtClean="0"/>
-              <a:t>13/11/2023</a:t>
+              <a:t>19/11/2023</a:t>
             </a:fld>
             <a:endParaRPr lang="en-GB"/>
           </a:p>
@@ -4604,7 +4604,7 @@
           <a:p>
             <a:fld id="{BE66BE40-8B0C-4A52-BD4D-0C8256116241}" type="datetimeFigureOut">
               <a:rPr lang="en-GB" smtClean="0"/>
-              <a:t>13/11/2023</a:t>
+              <a:t>19/11/2023</a:t>
             </a:fld>
             <a:endParaRPr lang="en-GB"/>
           </a:p>
@@ -4861,7 +4861,7 @@
           <a:p>
             <a:fld id="{BE66BE40-8B0C-4A52-BD4D-0C8256116241}" type="datetimeFigureOut">
               <a:rPr lang="en-GB" smtClean="0"/>
-              <a:t>13/11/2023</a:t>
+              <a:t>19/11/2023</a:t>
             </a:fld>
             <a:endParaRPr lang="en-GB"/>
           </a:p>
@@ -5074,7 +5074,7 @@
           <a:p>
             <a:fld id="{BE66BE40-8B0C-4A52-BD4D-0C8256116241}" type="datetimeFigureOut">
               <a:rPr lang="en-GB" smtClean="0"/>
-              <a:t>13/11/2023</a:t>
+              <a:t>19/11/2023</a:t>
             </a:fld>
             <a:endParaRPr lang="en-GB"/>
           </a:p>
@@ -10965,7 +10965,7 @@
                   </a:schemeClr>
                 </a:solidFill>
               </a:rPr>
-              <a:t>OBS</a:t>
+              <a:t>SYNOP</a:t>
             </a:r>
           </a:p>
         </p:txBody>

</xml_diff>